<commit_message>
Updates to NBN slides
</commit_message>
<xml_diff>
--- a/FINAl_PRESENTATION.pptx
+++ b/FINAl_PRESENTATION.pptx
@@ -5,32 +5,27 @@
     <p:sldMasterId id="2147483804" r:id="rId1"/>
   </p:sldMasterIdLst>
   <p:notesMasterIdLst>
-    <p:notesMasterId r:id="rId17"/>
+    <p:notesMasterId r:id="rId12"/>
   </p:notesMasterIdLst>
   <p:handoutMasterIdLst>
-    <p:handoutMasterId r:id="rId18"/>
+    <p:handoutMasterId r:id="rId13"/>
   </p:handoutMasterIdLst>
   <p:sldIdLst>
     <p:sldId id="256" r:id="rId2"/>
-    <p:sldId id="257" r:id="rId3"/>
-    <p:sldId id="258" r:id="rId4"/>
-    <p:sldId id="264" r:id="rId5"/>
-    <p:sldId id="265" r:id="rId6"/>
-    <p:sldId id="266" r:id="rId7"/>
-    <p:sldId id="267" r:id="rId8"/>
-    <p:sldId id="268" r:id="rId9"/>
-    <p:sldId id="269" r:id="rId10"/>
-    <p:sldId id="270" r:id="rId11"/>
-    <p:sldId id="259" r:id="rId12"/>
-    <p:sldId id="263" r:id="rId13"/>
-    <p:sldId id="260" r:id="rId14"/>
-    <p:sldId id="261" r:id="rId15"/>
-    <p:sldId id="262" r:id="rId16"/>
+    <p:sldId id="258" r:id="rId3"/>
+    <p:sldId id="264" r:id="rId4"/>
+    <p:sldId id="265" r:id="rId5"/>
+    <p:sldId id="266" r:id="rId6"/>
+    <p:sldId id="267" r:id="rId7"/>
+    <p:sldId id="268" r:id="rId8"/>
+    <p:sldId id="269" r:id="rId9"/>
+    <p:sldId id="270" r:id="rId10"/>
+    <p:sldId id="263" r:id="rId11"/>
   </p:sldIdLst>
   <p:sldSz cx="9144000" cy="6858000" type="screen4x3"/>
   <p:notesSz cx="7315200" cy="9601200"/>
   <p:custDataLst>
-    <p:tags r:id="rId19"/>
+    <p:tags r:id="rId14"/>
   </p:custDataLst>
   <p:defaultTextStyle>
     <a:defPPr>
@@ -326,7 +321,7 @@
           <a:p>
             <a:fld id="{98944DA0-7E15-49AE-9E1A-06C658B442E2}" type="datetimeFigureOut">
               <a:rPr lang="en-US" smtClean="0"/>
-              <a:t>12/7/2023</a:t>
+              <a:t>12/10/2023</a:t>
             </a:fld>
             <a:endParaRPr lang="en-US"/>
           </a:p>
@@ -491,7 +486,7 @@
           <a:p>
             <a:fld id="{18A1A218-A232-42EB-9526-47647B116190}" type="datetimeFigureOut">
               <a:rPr lang="en-US" smtClean="0"/>
-              <a:t>12/7/2023</a:t>
+              <a:t>12/10/2023</a:t>
             </a:fld>
             <a:endParaRPr lang="en-US"/>
           </a:p>
@@ -3777,232 +3772,6 @@
           <p:cNvPr id="2" name="Title 1">
             <a:extLst>
               <a:ext uri="{FF2B5EF4-FFF2-40B4-BE49-F238E27FC236}">
-                <a16:creationId xmlns:a16="http://schemas.microsoft.com/office/drawing/2014/main" id="{6BBDFEFC-643D-1E91-F069-487F3FBAD5D1}"/>
-              </a:ext>
-            </a:extLst>
-          </p:cNvPr>
-          <p:cNvSpPr>
-            <a:spLocks noGrp="1"/>
-          </p:cNvSpPr>
-          <p:nvPr>
-            <p:ph type="title"/>
-          </p:nvPr>
-        </p:nvSpPr>
-        <p:spPr/>
-        <p:txBody>
-          <a:bodyPr/>
-          <a:lstStyle/>
-          <a:p>
-            <a:r>
-              <a:rPr lang="en-US" dirty="0"/>
-              <a:t>Activity 3 Cont.</a:t>
-            </a:r>
-          </a:p>
-        </p:txBody>
-      </p:sp>
-      <p:sp>
-        <p:nvSpPr>
-          <p:cNvPr id="3" name="Content Placeholder 2">
-            <a:extLst>
-              <a:ext uri="{FF2B5EF4-FFF2-40B4-BE49-F238E27FC236}">
-                <a16:creationId xmlns:a16="http://schemas.microsoft.com/office/drawing/2014/main" id="{C5246BD0-DF04-9EDB-6EE3-EAE913D32D0E}"/>
-              </a:ext>
-            </a:extLst>
-          </p:cNvPr>
-          <p:cNvSpPr>
-            <a:spLocks noGrp="1"/>
-          </p:cNvSpPr>
-          <p:nvPr>
-            <p:ph idx="1"/>
-          </p:nvPr>
-        </p:nvSpPr>
-        <p:spPr/>
-        <p:txBody>
-          <a:bodyPr/>
-          <a:lstStyle/>
-          <a:p>
-            <a:pPr marL="342900" indent="-342900">
-              <a:buFont typeface="Arial" panose="020B0604020202020204" pitchFamily="34" charset="0"/>
-              <a:buChar char="•"/>
-            </a:pPr>
-            <a:r>
-              <a:rPr lang="en-US" sz="2000" b="1" kern="100" dirty="0">
-                <a:latin typeface="Calibri" panose="020F0502020204030204" pitchFamily="34" charset="0"/>
-                <a:ea typeface="Calibri" panose="020F0502020204030204" pitchFamily="34" charset="0"/>
-                <a:cs typeface="Times New Roman" panose="02020603050405020304" pitchFamily="18" charset="0"/>
-              </a:rPr>
-              <a:t>Comparison of Narrow Band (NB) Broad Band (BB) Noise Filtering</a:t>
-            </a:r>
-          </a:p>
-          <a:p>
-            <a:pPr marL="800100" lvl="1" indent="-342900"/>
-            <a:r>
-              <a:rPr lang="en-US" kern="100" dirty="0">
-                <a:latin typeface="Calibri" panose="020F0502020204030204" pitchFamily="34" charset="0"/>
-                <a:ea typeface="Calibri" panose="020F0502020204030204" pitchFamily="34" charset="0"/>
-                <a:cs typeface="Times New Roman" panose="02020603050405020304" pitchFamily="18" charset="0"/>
-              </a:rPr>
-              <a:t>Which type of noise signal is the easiest to filter?</a:t>
-            </a:r>
-          </a:p>
-          <a:p>
-            <a:pPr marL="800100" lvl="1" indent="-342900"/>
-            <a:r>
-              <a:rPr lang="en-US" sz="2000" kern="100" dirty="0">
-                <a:latin typeface="Calibri" panose="020F0502020204030204" pitchFamily="34" charset="0"/>
-                <a:ea typeface="Calibri" panose="020F0502020204030204" pitchFamily="34" charset="0"/>
-                <a:cs typeface="Times New Roman" panose="02020603050405020304" pitchFamily="18" charset="0"/>
-              </a:rPr>
-              <a:t>What filter is most efficient in protecting against:</a:t>
-            </a:r>
-          </a:p>
-          <a:p>
-            <a:pPr marL="1485900" lvl="2" indent="-342900"/>
-            <a:r>
-              <a:rPr lang="en-US" kern="100" dirty="0">
-                <a:latin typeface="Calibri" panose="020F0502020204030204" pitchFamily="34" charset="0"/>
-                <a:ea typeface="Calibri" panose="020F0502020204030204" pitchFamily="34" charset="0"/>
-                <a:cs typeface="Times New Roman" panose="02020603050405020304" pitchFamily="18" charset="0"/>
-              </a:rPr>
-              <a:t>NBN</a:t>
-            </a:r>
-          </a:p>
-          <a:p>
-            <a:pPr marL="1485900" lvl="2" indent="-342900"/>
-            <a:r>
-              <a:rPr lang="en-US" sz="2000" kern="100" dirty="0">
-                <a:latin typeface="Calibri" panose="020F0502020204030204" pitchFamily="34" charset="0"/>
-                <a:ea typeface="Calibri" panose="020F0502020204030204" pitchFamily="34" charset="0"/>
-                <a:cs typeface="Times New Roman" panose="02020603050405020304" pitchFamily="18" charset="0"/>
-              </a:rPr>
-              <a:t>BBN</a:t>
-            </a:r>
-          </a:p>
-          <a:p>
-            <a:pPr marL="342900" indent="-342900">
-              <a:buFont typeface="Arial" panose="020B0604020202020204" pitchFamily="34" charset="0"/>
-              <a:buChar char="•"/>
-            </a:pPr>
-            <a:r>
-              <a:rPr lang="en-US" sz="2000" kern="100" dirty="0">
-                <a:latin typeface="Calibri" panose="020F0502020204030204" pitchFamily="34" charset="0"/>
-                <a:ea typeface="Calibri" panose="020F0502020204030204" pitchFamily="34" charset="0"/>
-                <a:cs typeface="Times New Roman" panose="02020603050405020304" pitchFamily="18" charset="0"/>
-              </a:rPr>
-              <a:t>Need to propose a redesign of the filter that will improve the Signal to Noise ratio by at least 6 dB for NBN given the noise characteristics</a:t>
-            </a:r>
-          </a:p>
-          <a:p>
-            <a:endParaRPr lang="en-US" dirty="0"/>
-          </a:p>
-        </p:txBody>
-      </p:sp>
-    </p:spTree>
-    <p:extLst>
-      <p:ext uri="{BB962C8B-B14F-4D97-AF65-F5344CB8AC3E}">
-        <p14:creationId xmlns:p14="http://schemas.microsoft.com/office/powerpoint/2010/main" val="1208810237"/>
-      </p:ext>
-    </p:extLst>
-  </p:cSld>
-  <p:clrMapOvr>
-    <a:masterClrMapping/>
-  </p:clrMapOvr>
-</p:sld>
-</file>
-
-<file path=ppt/slides/slide11.xml><?xml version="1.0" encoding="utf-8"?>
-<p:sld xmlns:a="http://schemas.openxmlformats.org/drawingml/2006/main" xmlns:r="http://schemas.openxmlformats.org/officeDocument/2006/relationships" xmlns:p="http://schemas.openxmlformats.org/presentationml/2006/main">
-  <p:cSld>
-    <p:spTree>
-      <p:nvGrpSpPr>
-        <p:cNvPr id="1" name=""/>
-        <p:cNvGrpSpPr/>
-        <p:nvPr/>
-      </p:nvGrpSpPr>
-      <p:grpSpPr>
-        <a:xfrm>
-          <a:off x="0" y="0"/>
-          <a:ext cx="0" cy="0"/>
-          <a:chOff x="0" y="0"/>
-          <a:chExt cx="0" cy="0"/>
-        </a:xfrm>
-      </p:grpSpPr>
-      <p:sp>
-        <p:nvSpPr>
-          <p:cNvPr id="2" name="Title 1"/>
-          <p:cNvSpPr>
-            <a:spLocks noGrp="1"/>
-          </p:cNvSpPr>
-          <p:nvPr>
-            <p:ph type="title"/>
-          </p:nvPr>
-        </p:nvSpPr>
-        <p:spPr/>
-        <p:txBody>
-          <a:bodyPr/>
-          <a:lstStyle/>
-          <a:p>
-            <a:r>
-              <a:rPr lang="en-US" dirty="0"/>
-              <a:t>Filter Design</a:t>
-            </a:r>
-          </a:p>
-        </p:txBody>
-      </p:sp>
-      <p:sp>
-        <p:nvSpPr>
-          <p:cNvPr id="3" name="Content Placeholder 2"/>
-          <p:cNvSpPr>
-            <a:spLocks noGrp="1"/>
-          </p:cNvSpPr>
-          <p:nvPr>
-            <p:ph sz="half" idx="1"/>
-          </p:nvPr>
-        </p:nvSpPr>
-        <p:spPr/>
-        <p:txBody>
-          <a:bodyPr/>
-          <a:lstStyle/>
-          <a:p>
-            <a:endParaRPr lang="en-US"/>
-          </a:p>
-        </p:txBody>
-      </p:sp>
-    </p:spTree>
-    <p:extLst>
-      <p:ext uri="{BB962C8B-B14F-4D97-AF65-F5344CB8AC3E}">
-        <p14:creationId xmlns:p14="http://schemas.microsoft.com/office/powerpoint/2010/main" val="1025293086"/>
-      </p:ext>
-    </p:extLst>
-  </p:cSld>
-  <p:clrMapOvr>
-    <a:masterClrMapping/>
-  </p:clrMapOvr>
-</p:sld>
-</file>
-
-<file path=ppt/slides/slide12.xml><?xml version="1.0" encoding="utf-8"?>
-<p:sld xmlns:a="http://schemas.openxmlformats.org/drawingml/2006/main" xmlns:r="http://schemas.openxmlformats.org/officeDocument/2006/relationships" xmlns:p="http://schemas.openxmlformats.org/presentationml/2006/main">
-  <p:cSld>
-    <p:spTree>
-      <p:nvGrpSpPr>
-        <p:cNvPr id="1" name=""/>
-        <p:cNvGrpSpPr/>
-        <p:nvPr/>
-      </p:nvGrpSpPr>
-      <p:grpSpPr>
-        <a:xfrm>
-          <a:off x="0" y="0"/>
-          <a:ext cx="0" cy="0"/>
-          <a:chOff x="0" y="0"/>
-          <a:chExt cx="0" cy="0"/>
-        </a:xfrm>
-      </p:grpSpPr>
-      <p:sp>
-        <p:nvSpPr>
-          <p:cNvPr id="2" name="Title 1">
-            <a:extLst>
-              <a:ext uri="{FF2B5EF4-FFF2-40B4-BE49-F238E27FC236}">
                 <a16:creationId xmlns:a16="http://schemas.microsoft.com/office/drawing/2014/main" id="{1AFB9272-951B-398C-8A9F-FEF6C6CD5E6C}"/>
               </a:ext>
             </a:extLst>
@@ -4096,153 +3865,6 @@
 </p:sld>
 </file>
 
-<file path=ppt/slides/slide13.xml><?xml version="1.0" encoding="utf-8"?>
-<p:sld xmlns:a="http://schemas.openxmlformats.org/drawingml/2006/main" xmlns:r="http://schemas.openxmlformats.org/officeDocument/2006/relationships" xmlns:p="http://schemas.openxmlformats.org/presentationml/2006/main">
-  <p:cSld>
-    <p:spTree>
-      <p:nvGrpSpPr>
-        <p:cNvPr id="1" name=""/>
-        <p:cNvGrpSpPr/>
-        <p:nvPr/>
-      </p:nvGrpSpPr>
-      <p:grpSpPr>
-        <a:xfrm>
-          <a:off x="0" y="0"/>
-          <a:ext cx="0" cy="0"/>
-          <a:chOff x="0" y="0"/>
-          <a:chExt cx="0" cy="0"/>
-        </a:xfrm>
-      </p:grpSpPr>
-      <p:sp>
-        <p:nvSpPr>
-          <p:cNvPr id="2" name="Content Placeholder 1"/>
-          <p:cNvSpPr>
-            <a:spLocks noGrp="1"/>
-          </p:cNvSpPr>
-          <p:nvPr>
-            <p:ph idx="1"/>
-          </p:nvPr>
-        </p:nvSpPr>
-        <p:spPr/>
-        <p:txBody>
-          <a:bodyPr/>
-          <a:lstStyle/>
-          <a:p>
-            <a:endParaRPr lang="en-US"/>
-          </a:p>
-        </p:txBody>
-      </p:sp>
-      <p:sp>
-        <p:nvSpPr>
-          <p:cNvPr id="3" name="Title 2"/>
-          <p:cNvSpPr>
-            <a:spLocks noGrp="1"/>
-          </p:cNvSpPr>
-          <p:nvPr>
-            <p:ph type="title"/>
-          </p:nvPr>
-        </p:nvSpPr>
-        <p:spPr/>
-        <p:txBody>
-          <a:bodyPr/>
-          <a:lstStyle/>
-          <a:p>
-            <a:endParaRPr lang="en-US"/>
-          </a:p>
-        </p:txBody>
-      </p:sp>
-    </p:spTree>
-    <p:extLst>
-      <p:ext uri="{BB962C8B-B14F-4D97-AF65-F5344CB8AC3E}">
-        <p14:creationId xmlns:p14="http://schemas.microsoft.com/office/powerpoint/2010/main" val="131623498"/>
-      </p:ext>
-    </p:extLst>
-  </p:cSld>
-  <p:clrMapOvr>
-    <a:masterClrMapping/>
-  </p:clrMapOvr>
-</p:sld>
-</file>
-
-<file path=ppt/slides/slide14.xml><?xml version="1.0" encoding="utf-8"?>
-<p:sld xmlns:a="http://schemas.openxmlformats.org/drawingml/2006/main" xmlns:r="http://schemas.openxmlformats.org/officeDocument/2006/relationships" xmlns:p="http://schemas.openxmlformats.org/presentationml/2006/main">
-  <p:cSld>
-    <p:spTree>
-      <p:nvGrpSpPr>
-        <p:cNvPr id="1" name=""/>
-        <p:cNvGrpSpPr/>
-        <p:nvPr/>
-      </p:nvGrpSpPr>
-      <p:grpSpPr>
-        <a:xfrm>
-          <a:off x="0" y="0"/>
-          <a:ext cx="0" cy="0"/>
-          <a:chOff x="0" y="0"/>
-          <a:chExt cx="0" cy="0"/>
-        </a:xfrm>
-      </p:grpSpPr>
-      <p:sp>
-        <p:nvSpPr>
-          <p:cNvPr id="2" name="Title 1"/>
-          <p:cNvSpPr>
-            <a:spLocks noGrp="1"/>
-          </p:cNvSpPr>
-          <p:nvPr>
-            <p:ph type="title"/>
-          </p:nvPr>
-        </p:nvSpPr>
-        <p:spPr/>
-        <p:txBody>
-          <a:bodyPr/>
-          <a:lstStyle/>
-          <a:p>
-            <a:endParaRPr lang="en-US"/>
-          </a:p>
-        </p:txBody>
-      </p:sp>
-    </p:spTree>
-    <p:extLst>
-      <p:ext uri="{BB962C8B-B14F-4D97-AF65-F5344CB8AC3E}">
-        <p14:creationId xmlns:p14="http://schemas.microsoft.com/office/powerpoint/2010/main" val="3583307725"/>
-      </p:ext>
-    </p:extLst>
-  </p:cSld>
-  <p:clrMapOvr>
-    <a:masterClrMapping/>
-  </p:clrMapOvr>
-</p:sld>
-</file>
-
-<file path=ppt/slides/slide15.xml><?xml version="1.0" encoding="utf-8"?>
-<p:sld xmlns:a="http://schemas.openxmlformats.org/drawingml/2006/main" xmlns:r="http://schemas.openxmlformats.org/officeDocument/2006/relationships" xmlns:p="http://schemas.openxmlformats.org/presentationml/2006/main">
-  <p:cSld>
-    <p:spTree>
-      <p:nvGrpSpPr>
-        <p:cNvPr id="1" name=""/>
-        <p:cNvGrpSpPr/>
-        <p:nvPr/>
-      </p:nvGrpSpPr>
-      <p:grpSpPr>
-        <a:xfrm>
-          <a:off x="0" y="0"/>
-          <a:ext cx="0" cy="0"/>
-          <a:chOff x="0" y="0"/>
-          <a:chExt cx="0" cy="0"/>
-        </a:xfrm>
-      </p:grpSpPr>
-    </p:spTree>
-    <p:extLst>
-      <p:ext uri="{BB962C8B-B14F-4D97-AF65-F5344CB8AC3E}">
-        <p14:creationId xmlns:p14="http://schemas.microsoft.com/office/powerpoint/2010/main" val="1784640093"/>
-      </p:ext>
-    </p:extLst>
-  </p:cSld>
-  <p:clrMapOvr>
-    <a:masterClrMapping/>
-  </p:clrMapOvr>
-</p:sld>
-</file>
-
 <file path=ppt/slides/slide2.xml><?xml version="1.0" encoding="utf-8"?>
 <p:sld xmlns:a="http://schemas.openxmlformats.org/drawingml/2006/main" xmlns:r="http://schemas.openxmlformats.org/officeDocument/2006/relationships" xmlns:p="http://schemas.openxmlformats.org/presentationml/2006/main">
   <p:cSld>
@@ -4262,32 +3884,7 @@
       </p:grpSpPr>
       <p:sp>
         <p:nvSpPr>
-          <p:cNvPr id="3" name="Text Placeholder 2"/>
-          <p:cNvSpPr>
-            <a:spLocks noGrp="1"/>
-          </p:cNvSpPr>
-          <p:nvPr>
-            <p:ph type="body" idx="1"/>
-          </p:nvPr>
-        </p:nvSpPr>
-        <p:spPr/>
-        <p:txBody>
-          <a:bodyPr/>
-          <a:lstStyle/>
-          <a:p>
-            <a:endParaRPr lang="en-US" dirty="0"/>
-          </a:p>
-        </p:txBody>
-      </p:sp>
-      <p:sp>
-        <p:nvSpPr>
-          <p:cNvPr id="5" name="Title 4">
-            <a:extLst>
-              <a:ext uri="{FF2B5EF4-FFF2-40B4-BE49-F238E27FC236}">
-                <a16:creationId xmlns:a16="http://schemas.microsoft.com/office/drawing/2014/main" id="{276E0631-0FF8-1405-1919-B21BBB722D73}"/>
-              </a:ext>
-            </a:extLst>
-          </p:cNvPr>
+          <p:cNvPr id="2" name="Title 1"/>
           <p:cNvSpPr>
             <a:spLocks noGrp="1"/>
           </p:cNvSpPr>
@@ -4300,14 +3897,111 @@
           <a:bodyPr/>
           <a:lstStyle/>
           <a:p>
-            <a:endParaRPr lang="en-US"/>
+            <a:r>
+              <a:rPr lang="en-US" dirty="0"/>
+              <a:t>Layout</a:t>
+            </a:r>
+          </a:p>
+        </p:txBody>
+      </p:sp>
+      <p:sp>
+        <p:nvSpPr>
+          <p:cNvPr id="3" name="Content Placeholder 2"/>
+          <p:cNvSpPr>
+            <a:spLocks noGrp="1"/>
+          </p:cNvSpPr>
+          <p:nvPr>
+            <p:ph idx="1"/>
+          </p:nvPr>
+        </p:nvSpPr>
+        <p:spPr/>
+        <p:txBody>
+          <a:bodyPr/>
+          <a:lstStyle/>
+          <a:p>
+            <a:pPr marL="342900" indent="-342900">
+              <a:buFont typeface="Arial" panose="020B0604020202020204" pitchFamily="34" charset="0"/>
+              <a:buChar char="•"/>
+            </a:pPr>
+            <a:r>
+              <a:rPr lang="en-US" dirty="0"/>
+              <a:t>Filter Design</a:t>
+            </a:r>
+          </a:p>
+          <a:p>
+            <a:pPr marL="800100" lvl="1" indent="-342900"/>
+            <a:r>
+              <a:rPr lang="en-US" dirty="0"/>
+              <a:t>For both high pass and band pass</a:t>
+            </a:r>
+          </a:p>
+          <a:p>
+            <a:pPr marL="342900" indent="-342900">
+              <a:buFont typeface="Arial" panose="020B0604020202020204" pitchFamily="34" charset="0"/>
+              <a:buChar char="•"/>
+            </a:pPr>
+            <a:r>
+              <a:rPr lang="en-US" dirty="0"/>
+              <a:t>Filter Analysis</a:t>
+            </a:r>
+          </a:p>
+          <a:p>
+            <a:pPr marL="342900" indent="-342900">
+              <a:buFont typeface="Arial" panose="020B0604020202020204" pitchFamily="34" charset="0"/>
+              <a:buChar char="•"/>
+            </a:pPr>
+            <a:r>
+              <a:rPr lang="en-US" dirty="0"/>
+              <a:t>Sine Wave Analysis</a:t>
+            </a:r>
+          </a:p>
+          <a:p>
+            <a:pPr marL="342900" indent="-342900">
+              <a:buFont typeface="Arial" panose="020B0604020202020204" pitchFamily="34" charset="0"/>
+              <a:buChar char="•"/>
+            </a:pPr>
+            <a:r>
+              <a:rPr lang="en-US" dirty="0" err="1"/>
+              <a:t>Diraq</a:t>
+            </a:r>
+            <a:r>
+              <a:rPr lang="en-US" dirty="0"/>
+              <a:t> Analysis (Do we need both)</a:t>
+            </a:r>
+          </a:p>
+          <a:p>
+            <a:pPr marL="342900" indent="-342900">
+              <a:buFont typeface="Arial" panose="020B0604020202020204" pitchFamily="34" charset="0"/>
+              <a:buChar char="•"/>
+            </a:pPr>
+            <a:endParaRPr lang="en-US" dirty="0"/>
+          </a:p>
+          <a:p>
+            <a:pPr marL="800100" lvl="1" indent="-342900"/>
+            <a:endParaRPr lang="en-US" dirty="0"/>
+          </a:p>
+          <a:p>
+            <a:pPr marL="800100" lvl="1" indent="-342900"/>
+            <a:endParaRPr lang="en-US" dirty="0"/>
+          </a:p>
+          <a:p>
+            <a:pPr marL="800100" lvl="1" indent="-342900"/>
+            <a:endParaRPr lang="en-US" dirty="0"/>
+          </a:p>
+          <a:p>
+            <a:pPr marL="342900" indent="-342900"/>
+            <a:endParaRPr lang="en-US" dirty="0"/>
+          </a:p>
+          <a:p>
+            <a:pPr marL="342900" indent="-342900"/>
+            <a:endParaRPr lang="en-US" dirty="0"/>
           </a:p>
         </p:txBody>
       </p:sp>
     </p:spTree>
     <p:extLst>
       <p:ext uri="{BB962C8B-B14F-4D97-AF65-F5344CB8AC3E}">
-        <p14:creationId xmlns:p14="http://schemas.microsoft.com/office/powerpoint/2010/main" val="1531908288"/>
+        <p14:creationId xmlns:p14="http://schemas.microsoft.com/office/powerpoint/2010/main" val="2025067195"/>
       </p:ext>
     </p:extLst>
   </p:cSld>
@@ -4336,7 +4030,13 @@
       </p:grpSpPr>
       <p:sp>
         <p:nvSpPr>
-          <p:cNvPr id="2" name="Title 1"/>
+          <p:cNvPr id="2" name="Title 1">
+            <a:extLst>
+              <a:ext uri="{FF2B5EF4-FFF2-40B4-BE49-F238E27FC236}">
+                <a16:creationId xmlns:a16="http://schemas.microsoft.com/office/drawing/2014/main" id="{1AFD1DD3-1C1C-D6F1-2320-ACADE46388B8}"/>
+              </a:ext>
+            </a:extLst>
+          </p:cNvPr>
           <p:cNvSpPr>
             <a:spLocks noGrp="1"/>
           </p:cNvSpPr>
@@ -4349,16 +4049,19 @@
           <a:bodyPr/>
           <a:lstStyle/>
           <a:p>
-            <a:r>
-              <a:rPr lang="en-US" dirty="0"/>
-              <a:t>Layout</a:t>
-            </a:r>
-          </a:p>
-        </p:txBody>
-      </p:sp>
-      <p:sp>
-        <p:nvSpPr>
-          <p:cNvPr id="3" name="Content Placeholder 2"/>
+            <a:endParaRPr lang="en-US"/>
+          </a:p>
+        </p:txBody>
+      </p:sp>
+      <p:sp>
+        <p:nvSpPr>
+          <p:cNvPr id="7" name="Content Placeholder 6">
+            <a:extLst>
+              <a:ext uri="{FF2B5EF4-FFF2-40B4-BE49-F238E27FC236}">
+                <a16:creationId xmlns:a16="http://schemas.microsoft.com/office/drawing/2014/main" id="{F3C44B2D-60EE-E0D5-ACC8-373B46E06EAC}"/>
+              </a:ext>
+            </a:extLst>
+          </p:cNvPr>
           <p:cNvSpPr>
             <a:spLocks noGrp="1"/>
           </p:cNvSpPr>
@@ -4371,89 +4074,69 @@
           <a:bodyPr/>
           <a:lstStyle/>
           <a:p>
-            <a:pPr marL="342900" indent="-342900">
-              <a:buFont typeface="Arial" panose="020B0604020202020204" pitchFamily="34" charset="0"/>
-              <a:buChar char="•"/>
-            </a:pPr>
-            <a:r>
-              <a:rPr lang="en-US" dirty="0"/>
-              <a:t>Filter Design</a:t>
-            </a:r>
-          </a:p>
-          <a:p>
-            <a:pPr marL="800100" lvl="1" indent="-342900"/>
-            <a:r>
-              <a:rPr lang="en-US" dirty="0"/>
-              <a:t>For both high pass and band pass</a:t>
-            </a:r>
-          </a:p>
-          <a:p>
-            <a:pPr marL="342900" indent="-342900">
-              <a:buFont typeface="Arial" panose="020B0604020202020204" pitchFamily="34" charset="0"/>
-              <a:buChar char="•"/>
-            </a:pPr>
-            <a:r>
-              <a:rPr lang="en-US" dirty="0"/>
-              <a:t>Filter Analysis</a:t>
-            </a:r>
-          </a:p>
-          <a:p>
-            <a:pPr marL="342900" indent="-342900">
-              <a:buFont typeface="Arial" panose="020B0604020202020204" pitchFamily="34" charset="0"/>
-              <a:buChar char="•"/>
-            </a:pPr>
-            <a:r>
-              <a:rPr lang="en-US" dirty="0"/>
-              <a:t>Sine Wave Analysis</a:t>
-            </a:r>
-          </a:p>
-          <a:p>
-            <a:pPr marL="342900" indent="-342900">
-              <a:buFont typeface="Arial" panose="020B0604020202020204" pitchFamily="34" charset="0"/>
-              <a:buChar char="•"/>
-            </a:pPr>
-            <a:r>
-              <a:rPr lang="en-US" dirty="0" err="1"/>
-              <a:t>Diraq</a:t>
-            </a:r>
-            <a:r>
-              <a:rPr lang="en-US" dirty="0"/>
-              <a:t> Analysis (Do we need both)</a:t>
-            </a:r>
-          </a:p>
-          <a:p>
-            <a:pPr marL="342900" indent="-342900">
-              <a:buFont typeface="Arial" panose="020B0604020202020204" pitchFamily="34" charset="0"/>
-              <a:buChar char="•"/>
-            </a:pPr>
-            <a:endParaRPr lang="en-US" dirty="0"/>
-          </a:p>
-          <a:p>
-            <a:pPr marL="800100" lvl="1" indent="-342900"/>
-            <a:endParaRPr lang="en-US" dirty="0"/>
-          </a:p>
-          <a:p>
-            <a:pPr marL="800100" lvl="1" indent="-342900"/>
-            <a:endParaRPr lang="en-US" dirty="0"/>
-          </a:p>
-          <a:p>
-            <a:pPr marL="800100" lvl="1" indent="-342900"/>
-            <a:endParaRPr lang="en-US" dirty="0"/>
-          </a:p>
-          <a:p>
-            <a:pPr marL="342900" indent="-342900"/>
-            <a:endParaRPr lang="en-US" dirty="0"/>
-          </a:p>
-          <a:p>
-            <a:pPr marL="342900" indent="-342900"/>
-            <a:endParaRPr lang="en-US" dirty="0"/>
+            <a:r>
+              <a:rPr lang="en-US" kern="100" dirty="0">
+                <a:latin typeface="Calibri" panose="020F0502020204030204" pitchFamily="34" charset="0"/>
+                <a:ea typeface="Calibri" panose="020F0502020204030204" pitchFamily="34" charset="0"/>
+                <a:cs typeface="Times New Roman" panose="02020603050405020304" pitchFamily="18" charset="0"/>
+              </a:rPr>
+              <a:t>PIS’ center frequency =(1/2)(</a:t>
+            </a:r>
+            <a:r>
+              <a:rPr lang="en-US" kern="100" dirty="0" err="1">
+                <a:latin typeface="Calibri" panose="020F0502020204030204" pitchFamily="34" charset="0"/>
+                <a:ea typeface="Calibri" panose="020F0502020204030204" pitchFamily="34" charset="0"/>
+                <a:cs typeface="Times New Roman" panose="02020603050405020304" pitchFamily="18" charset="0"/>
+              </a:rPr>
+              <a:t>f</a:t>
+            </a:r>
+            <a:r>
+              <a:rPr lang="en-US" kern="100" baseline="-25000" dirty="0" err="1">
+                <a:latin typeface="Calibri" panose="020F0502020204030204" pitchFamily="34" charset="0"/>
+                <a:ea typeface="Calibri" panose="020F0502020204030204" pitchFamily="34" charset="0"/>
+                <a:cs typeface="Times New Roman" panose="02020603050405020304" pitchFamily="18" charset="0"/>
+              </a:rPr>
+              <a:t>PISmin</a:t>
+            </a:r>
+            <a:r>
+              <a:rPr lang="en-US" kern="100" dirty="0">
+                <a:latin typeface="Calibri" panose="020F0502020204030204" pitchFamily="34" charset="0"/>
+                <a:ea typeface="Calibri" panose="020F0502020204030204" pitchFamily="34" charset="0"/>
+                <a:cs typeface="Times New Roman" panose="02020603050405020304" pitchFamily="18" charset="0"/>
+              </a:rPr>
+              <a:t> + </a:t>
+            </a:r>
+            <a:r>
+              <a:rPr lang="en-US" kern="100" dirty="0" err="1">
+                <a:latin typeface="Calibri" panose="020F0502020204030204" pitchFamily="34" charset="0"/>
+                <a:ea typeface="Calibri" panose="020F0502020204030204" pitchFamily="34" charset="0"/>
+                <a:cs typeface="Times New Roman" panose="02020603050405020304" pitchFamily="18" charset="0"/>
+              </a:rPr>
+              <a:t>f</a:t>
+            </a:r>
+            <a:r>
+              <a:rPr lang="en-US" kern="100" baseline="-25000" dirty="0" err="1">
+                <a:latin typeface="Calibri" panose="020F0502020204030204" pitchFamily="34" charset="0"/>
+                <a:ea typeface="Calibri" panose="020F0502020204030204" pitchFamily="34" charset="0"/>
+                <a:cs typeface="Times New Roman" panose="02020603050405020304" pitchFamily="18" charset="0"/>
+              </a:rPr>
+              <a:t>PISmax</a:t>
+            </a:r>
+            <a:r>
+              <a:rPr lang="en-US" kern="100" dirty="0">
+                <a:latin typeface="Calibri" panose="020F0502020204030204" pitchFamily="34" charset="0"/>
+                <a:ea typeface="Calibri" panose="020F0502020204030204" pitchFamily="34" charset="0"/>
+                <a:cs typeface="Times New Roman" panose="02020603050405020304" pitchFamily="18" charset="0"/>
+              </a:rPr>
+              <a:t>)</a:t>
+            </a:r>
           </a:p>
         </p:txBody>
       </p:sp>
     </p:spTree>
     <p:extLst>
       <p:ext uri="{BB962C8B-B14F-4D97-AF65-F5344CB8AC3E}">
-        <p14:creationId xmlns:p14="http://schemas.microsoft.com/office/powerpoint/2010/main" val="2025067195"/>
+        <p14:creationId xmlns:p14="http://schemas.microsoft.com/office/powerpoint/2010/main" val="1663137508"/>
       </p:ext>
     </p:extLst>
   </p:cSld>
@@ -4485,7 +4168,7 @@
           <p:cNvPr id="2" name="Title 1">
             <a:extLst>
               <a:ext uri="{FF2B5EF4-FFF2-40B4-BE49-F238E27FC236}">
-                <a16:creationId xmlns:a16="http://schemas.microsoft.com/office/drawing/2014/main" id="{1AFD1DD3-1C1C-D6F1-2320-ACADE46388B8}"/>
+                <a16:creationId xmlns:a16="http://schemas.microsoft.com/office/drawing/2014/main" id="{BE7560B2-2EF5-FA60-94F3-F5BB21FB0E9E}"/>
               </a:ext>
             </a:extLst>
           </p:cNvPr>
@@ -4501,16 +4184,19 @@
           <a:bodyPr/>
           <a:lstStyle/>
           <a:p>
-            <a:endParaRPr lang="en-US"/>
-          </a:p>
-        </p:txBody>
-      </p:sp>
-      <p:sp>
-        <p:nvSpPr>
-          <p:cNvPr id="7" name="Content Placeholder 6">
+            <a:r>
+              <a:rPr lang="en-US" dirty="0"/>
+              <a:t>Activity 1</a:t>
+            </a:r>
+          </a:p>
+        </p:txBody>
+      </p:sp>
+      <p:sp>
+        <p:nvSpPr>
+          <p:cNvPr id="3" name="Content Placeholder 2">
             <a:extLst>
               <a:ext uri="{FF2B5EF4-FFF2-40B4-BE49-F238E27FC236}">
-                <a16:creationId xmlns:a16="http://schemas.microsoft.com/office/drawing/2014/main" id="{F3C44B2D-60EE-E0D5-ACC8-373B46E06EAC}"/>
+                <a16:creationId xmlns:a16="http://schemas.microsoft.com/office/drawing/2014/main" id="{4EB42B85-6145-2759-554C-AD060A02F5E9}"/>
               </a:ext>
             </a:extLst>
           </p:cNvPr>
@@ -4527,60 +4213,28 @@
           <a:lstStyle/>
           <a:p>
             <a:r>
-              <a:rPr lang="en-US" kern="100" dirty="0">
-                <a:latin typeface="Calibri" panose="020F0502020204030204" pitchFamily="34" charset="0"/>
-                <a:ea typeface="Calibri" panose="020F0502020204030204" pitchFamily="34" charset="0"/>
-                <a:cs typeface="Times New Roman" panose="02020603050405020304" pitchFamily="18" charset="0"/>
-              </a:rPr>
-              <a:t>PIS’ center frequency =(1/2)(</a:t>
-            </a:r>
-            <a:r>
-              <a:rPr lang="en-US" kern="100" dirty="0" err="1">
-                <a:latin typeface="Calibri" panose="020F0502020204030204" pitchFamily="34" charset="0"/>
-                <a:ea typeface="Calibri" panose="020F0502020204030204" pitchFamily="34" charset="0"/>
-                <a:cs typeface="Times New Roman" panose="02020603050405020304" pitchFamily="18" charset="0"/>
-              </a:rPr>
-              <a:t>f</a:t>
-            </a:r>
-            <a:r>
-              <a:rPr lang="en-US" kern="100" baseline="-25000" dirty="0" err="1">
-                <a:latin typeface="Calibri" panose="020F0502020204030204" pitchFamily="34" charset="0"/>
-                <a:ea typeface="Calibri" panose="020F0502020204030204" pitchFamily="34" charset="0"/>
-                <a:cs typeface="Times New Roman" panose="02020603050405020304" pitchFamily="18" charset="0"/>
-              </a:rPr>
-              <a:t>PISmin</a:t>
-            </a:r>
-            <a:r>
-              <a:rPr lang="en-US" kern="100" dirty="0">
-                <a:latin typeface="Calibri" panose="020F0502020204030204" pitchFamily="34" charset="0"/>
-                <a:ea typeface="Calibri" panose="020F0502020204030204" pitchFamily="34" charset="0"/>
-                <a:cs typeface="Times New Roman" panose="02020603050405020304" pitchFamily="18" charset="0"/>
-              </a:rPr>
-              <a:t> + </a:t>
-            </a:r>
-            <a:r>
-              <a:rPr lang="en-US" kern="100" dirty="0" err="1">
-                <a:latin typeface="Calibri" panose="020F0502020204030204" pitchFamily="34" charset="0"/>
-                <a:ea typeface="Calibri" panose="020F0502020204030204" pitchFamily="34" charset="0"/>
-                <a:cs typeface="Times New Roman" panose="02020603050405020304" pitchFamily="18" charset="0"/>
-              </a:rPr>
-              <a:t>f</a:t>
-            </a:r>
-            <a:r>
-              <a:rPr lang="en-US" kern="100" baseline="-25000" dirty="0" err="1">
-                <a:latin typeface="Calibri" panose="020F0502020204030204" pitchFamily="34" charset="0"/>
-                <a:ea typeface="Calibri" panose="020F0502020204030204" pitchFamily="34" charset="0"/>
-                <a:cs typeface="Times New Roman" panose="02020603050405020304" pitchFamily="18" charset="0"/>
-              </a:rPr>
-              <a:t>PISmax</a:t>
-            </a:r>
-            <a:r>
-              <a:rPr lang="en-US" kern="100" dirty="0">
-                <a:latin typeface="Calibri" panose="020F0502020204030204" pitchFamily="34" charset="0"/>
-                <a:ea typeface="Calibri" panose="020F0502020204030204" pitchFamily="34" charset="0"/>
-                <a:cs typeface="Times New Roman" panose="02020603050405020304" pitchFamily="18" charset="0"/>
-              </a:rPr>
-              <a:t>)</a:t>
+              <a:rPr lang="en-US" dirty="0"/>
+              <a:t>Building each filter</a:t>
+            </a:r>
+          </a:p>
+          <a:p>
+            <a:pPr marL="342900" indent="-342900">
+              <a:buFont typeface="Arial" panose="020B0604020202020204" pitchFamily="34" charset="0"/>
+              <a:buChar char="•"/>
+            </a:pPr>
+            <a:r>
+              <a:rPr lang="en-US" dirty="0"/>
+              <a:t>Should have screenshots of the layout and brief description of each.</a:t>
+            </a:r>
+          </a:p>
+          <a:p>
+            <a:pPr marL="342900" indent="-342900">
+              <a:buFont typeface="Arial" panose="020B0604020202020204" pitchFamily="34" charset="0"/>
+              <a:buChar char="•"/>
+            </a:pPr>
+            <a:r>
+              <a:rPr lang="en-US" dirty="0"/>
+              <a:t>Should performance requirements be added here or later?</a:t>
             </a:r>
           </a:p>
         </p:txBody>
@@ -4588,7 +4242,7 @@
     </p:spTree>
     <p:extLst>
       <p:ext uri="{BB962C8B-B14F-4D97-AF65-F5344CB8AC3E}">
-        <p14:creationId xmlns:p14="http://schemas.microsoft.com/office/powerpoint/2010/main" val="1663137508"/>
+        <p14:creationId xmlns:p14="http://schemas.microsoft.com/office/powerpoint/2010/main" val="1276224201"/>
       </p:ext>
     </p:extLst>
   </p:cSld>
@@ -4620,112 +4274,6 @@
           <p:cNvPr id="2" name="Title 1">
             <a:extLst>
               <a:ext uri="{FF2B5EF4-FFF2-40B4-BE49-F238E27FC236}">
-                <a16:creationId xmlns:a16="http://schemas.microsoft.com/office/drawing/2014/main" id="{BE7560B2-2EF5-FA60-94F3-F5BB21FB0E9E}"/>
-              </a:ext>
-            </a:extLst>
-          </p:cNvPr>
-          <p:cNvSpPr>
-            <a:spLocks noGrp="1"/>
-          </p:cNvSpPr>
-          <p:nvPr>
-            <p:ph type="title"/>
-          </p:nvPr>
-        </p:nvSpPr>
-        <p:spPr/>
-        <p:txBody>
-          <a:bodyPr/>
-          <a:lstStyle/>
-          <a:p>
-            <a:r>
-              <a:rPr lang="en-US" dirty="0"/>
-              <a:t>Activity 1</a:t>
-            </a:r>
-          </a:p>
-        </p:txBody>
-      </p:sp>
-      <p:sp>
-        <p:nvSpPr>
-          <p:cNvPr id="3" name="Content Placeholder 2">
-            <a:extLst>
-              <a:ext uri="{FF2B5EF4-FFF2-40B4-BE49-F238E27FC236}">
-                <a16:creationId xmlns:a16="http://schemas.microsoft.com/office/drawing/2014/main" id="{4EB42B85-6145-2759-554C-AD060A02F5E9}"/>
-              </a:ext>
-            </a:extLst>
-          </p:cNvPr>
-          <p:cNvSpPr>
-            <a:spLocks noGrp="1"/>
-          </p:cNvSpPr>
-          <p:nvPr>
-            <p:ph idx="1"/>
-          </p:nvPr>
-        </p:nvSpPr>
-        <p:spPr/>
-        <p:txBody>
-          <a:bodyPr/>
-          <a:lstStyle/>
-          <a:p>
-            <a:r>
-              <a:rPr lang="en-US" dirty="0"/>
-              <a:t>Building each filter</a:t>
-            </a:r>
-          </a:p>
-          <a:p>
-            <a:pPr marL="342900" indent="-342900">
-              <a:buFont typeface="Arial" panose="020B0604020202020204" pitchFamily="34" charset="0"/>
-              <a:buChar char="•"/>
-            </a:pPr>
-            <a:r>
-              <a:rPr lang="en-US" dirty="0"/>
-              <a:t>Should have screenshots of the layout and brief description of each.</a:t>
-            </a:r>
-          </a:p>
-          <a:p>
-            <a:pPr marL="342900" indent="-342900">
-              <a:buFont typeface="Arial" panose="020B0604020202020204" pitchFamily="34" charset="0"/>
-              <a:buChar char="•"/>
-            </a:pPr>
-            <a:r>
-              <a:rPr lang="en-US" dirty="0"/>
-              <a:t>Should performance requirements be added here or later?</a:t>
-            </a:r>
-          </a:p>
-        </p:txBody>
-      </p:sp>
-    </p:spTree>
-    <p:extLst>
-      <p:ext uri="{BB962C8B-B14F-4D97-AF65-F5344CB8AC3E}">
-        <p14:creationId xmlns:p14="http://schemas.microsoft.com/office/powerpoint/2010/main" val="1276224201"/>
-      </p:ext>
-    </p:extLst>
-  </p:cSld>
-  <p:clrMapOvr>
-    <a:masterClrMapping/>
-  </p:clrMapOvr>
-</p:sld>
-</file>
-
-<file path=ppt/slides/slide6.xml><?xml version="1.0" encoding="utf-8"?>
-<p:sld xmlns:a="http://schemas.openxmlformats.org/drawingml/2006/main" xmlns:r="http://schemas.openxmlformats.org/officeDocument/2006/relationships" xmlns:p="http://schemas.openxmlformats.org/presentationml/2006/main">
-  <p:cSld>
-    <p:spTree>
-      <p:nvGrpSpPr>
-        <p:cNvPr id="1" name=""/>
-        <p:cNvGrpSpPr/>
-        <p:nvPr/>
-      </p:nvGrpSpPr>
-      <p:grpSpPr>
-        <a:xfrm>
-          <a:off x="0" y="0"/>
-          <a:ext cx="0" cy="0"/>
-          <a:chOff x="0" y="0"/>
-          <a:chExt cx="0" cy="0"/>
-        </a:xfrm>
-      </p:grpSpPr>
-      <p:sp>
-        <p:nvSpPr>
-          <p:cNvPr id="2" name="Title 1">
-            <a:extLst>
-              <a:ext uri="{FF2B5EF4-FFF2-40B4-BE49-F238E27FC236}">
                 <a16:creationId xmlns:a16="http://schemas.microsoft.com/office/drawing/2014/main" id="{561B0710-5705-7BAA-1ED3-990CFF57DEEC}"/>
               </a:ext>
             </a:extLst>
@@ -4749,8 +4297,8 @@
           </a:p>
         </p:txBody>
       </p:sp>
-      <mc:AlternateContent xmlns:mc="http://schemas.openxmlformats.org/markup-compatibility/2006">
-        <mc:Choice xmlns:a14="http://schemas.microsoft.com/office/drawing/2010/main" Requires="a14">
+      <mc:AlternateContent xmlns:mc="http://schemas.openxmlformats.org/markup-compatibility/2006" xmlns:a14="http://schemas.microsoft.com/office/drawing/2010/main">
+        <mc:Choice Requires="a14">
           <p:sp>
             <p:nvSpPr>
               <p:cNvPr id="3" name="Content Placeholder 2">
@@ -4914,7 +4462,7 @@
             </p:txBody>
           </p:sp>
         </mc:Choice>
-        <mc:Fallback>
+        <mc:Fallback xmlns="">
           <p:sp>
             <p:nvSpPr>
               <p:cNvPr id="3" name="Content Placeholder 2">
@@ -4967,6 +4515,184 @@
 </p:sld>
 </file>
 
+<file path=ppt/slides/slide6.xml><?xml version="1.0" encoding="utf-8"?>
+<p:sld xmlns:a="http://schemas.openxmlformats.org/drawingml/2006/main" xmlns:r="http://schemas.openxmlformats.org/officeDocument/2006/relationships" xmlns:p="http://schemas.openxmlformats.org/presentationml/2006/main">
+  <p:cSld>
+    <p:spTree>
+      <p:nvGrpSpPr>
+        <p:cNvPr id="1" name=""/>
+        <p:cNvGrpSpPr/>
+        <p:nvPr/>
+      </p:nvGrpSpPr>
+      <p:grpSpPr>
+        <a:xfrm>
+          <a:off x="0" y="0"/>
+          <a:ext cx="0" cy="0"/>
+          <a:chOff x="0" y="0"/>
+          <a:chExt cx="0" cy="0"/>
+        </a:xfrm>
+      </p:grpSpPr>
+      <p:sp>
+        <p:nvSpPr>
+          <p:cNvPr id="2" name="Title 1">
+            <a:extLst>
+              <a:ext uri="{FF2B5EF4-FFF2-40B4-BE49-F238E27FC236}">
+                <a16:creationId xmlns:a16="http://schemas.microsoft.com/office/drawing/2014/main" id="{C778E3D7-EDB8-FB1A-B95E-8E8279798820}"/>
+              </a:ext>
+            </a:extLst>
+          </p:cNvPr>
+          <p:cNvSpPr>
+            <a:spLocks noGrp="1"/>
+          </p:cNvSpPr>
+          <p:nvPr>
+            <p:ph type="title"/>
+          </p:nvPr>
+        </p:nvSpPr>
+        <p:spPr/>
+        <p:txBody>
+          <a:bodyPr/>
+          <a:lstStyle/>
+          <a:p>
+            <a:r>
+              <a:rPr lang="en-US" dirty="0"/>
+              <a:t>Activity 3</a:t>
+            </a:r>
+          </a:p>
+        </p:txBody>
+      </p:sp>
+      <p:sp>
+        <p:nvSpPr>
+          <p:cNvPr id="3" name="Content Placeholder 2">
+            <a:extLst>
+              <a:ext uri="{FF2B5EF4-FFF2-40B4-BE49-F238E27FC236}">
+                <a16:creationId xmlns:a16="http://schemas.microsoft.com/office/drawing/2014/main" id="{78A5FF63-E4E5-CF82-625E-96C579770BE5}"/>
+              </a:ext>
+            </a:extLst>
+          </p:cNvPr>
+          <p:cNvSpPr>
+            <a:spLocks noGrp="1"/>
+          </p:cNvSpPr>
+          <p:nvPr>
+            <p:ph idx="1"/>
+          </p:nvPr>
+        </p:nvSpPr>
+        <p:spPr/>
+        <p:txBody>
+          <a:bodyPr/>
+          <a:lstStyle/>
+          <a:p>
+            <a:r>
+              <a:rPr lang="en-US" dirty="0"/>
+              <a:t>Filter ability to clean up input signal (noise)</a:t>
+            </a:r>
+          </a:p>
+          <a:p>
+            <a:pPr marL="342900" indent="-342900">
+              <a:buFont typeface="Arial" panose="020B0604020202020204" pitchFamily="34" charset="0"/>
+              <a:buChar char="•"/>
+            </a:pPr>
+            <a:r>
+              <a:rPr lang="en-US" dirty="0"/>
+              <a:t>Must compare PIS before and after</a:t>
+            </a:r>
+          </a:p>
+          <a:p>
+            <a:pPr marL="342900" indent="-342900">
+              <a:buFont typeface="Arial" panose="020B0604020202020204" pitchFamily="34" charset="0"/>
+              <a:buChar char="•"/>
+            </a:pPr>
+            <a:r>
+              <a:rPr lang="en-US" dirty="0">
+                <a:highlight>
+                  <a:srgbClr val="FFFF00"/>
+                </a:highlight>
+              </a:rPr>
+              <a:t>Noise must be one of the following</a:t>
+            </a:r>
+          </a:p>
+          <a:p>
+            <a:pPr marL="800100" lvl="1" indent="-342900"/>
+            <a:r>
+              <a:rPr lang="en-US" kern="100" dirty="0">
+                <a:latin typeface="Calibri" panose="020F0502020204030204" pitchFamily="34" charset="0"/>
+                <a:ea typeface="Calibri" panose="020F0502020204030204" pitchFamily="34" charset="0"/>
+                <a:cs typeface="Times New Roman" panose="02020603050405020304" pitchFamily="18" charset="0"/>
+              </a:rPr>
+              <a:t>A sinewave alone applied to the </a:t>
+            </a:r>
+            <a:r>
+              <a:rPr lang="en-US" sz="2000" kern="100" dirty="0">
+                <a:latin typeface="Calibri" panose="020F0502020204030204" pitchFamily="34" charset="0"/>
+                <a:ea typeface="Calibri" panose="020F0502020204030204" pitchFamily="34" charset="0"/>
+                <a:cs typeface="Times New Roman" panose="02020603050405020304" pitchFamily="18" charset="0"/>
+              </a:rPr>
+              <a:t>Narrow Band Noise (NBN) block</a:t>
+            </a:r>
+            <a:r>
+              <a:rPr lang="en-US" sz="2000" kern="100" dirty="0">
+                <a:solidFill>
+                  <a:srgbClr val="FF0000"/>
+                </a:solidFill>
+                <a:latin typeface="Calibri" panose="020F0502020204030204" pitchFamily="34" charset="0"/>
+                <a:ea typeface="Calibri" panose="020F0502020204030204" pitchFamily="34" charset="0"/>
+                <a:cs typeface="Times New Roman" panose="02020603050405020304" pitchFamily="18" charset="0"/>
+              </a:rPr>
+              <a:t> (See slide 8)</a:t>
+            </a:r>
+          </a:p>
+          <a:p>
+            <a:pPr marL="800100" lvl="1" indent="-342900"/>
+            <a:r>
+              <a:rPr lang="en-US" sz="2000" kern="100" dirty="0">
+                <a:latin typeface="Calibri" panose="020F0502020204030204" pitchFamily="34" charset="0"/>
+                <a:ea typeface="Calibri" panose="020F0502020204030204" pitchFamily="34" charset="0"/>
+                <a:cs typeface="Times New Roman" panose="02020603050405020304" pitchFamily="18" charset="0"/>
+              </a:rPr>
+              <a:t>A Gaussian white noise alone applied  to the Random Source block. This signal is also called Broad Band Noise (BBN) </a:t>
+            </a:r>
+            <a:r>
+              <a:rPr lang="en-US" sz="2000" kern="100" dirty="0">
+                <a:solidFill>
+                  <a:srgbClr val="FF0000"/>
+                </a:solidFill>
+                <a:latin typeface="Calibri" panose="020F0502020204030204" pitchFamily="34" charset="0"/>
+                <a:ea typeface="Calibri" panose="020F0502020204030204" pitchFamily="34" charset="0"/>
+                <a:cs typeface="Times New Roman" panose="02020603050405020304" pitchFamily="18" charset="0"/>
+              </a:rPr>
+              <a:t>(See slide 9)</a:t>
+            </a:r>
+            <a:endParaRPr lang="en-US" sz="2000" kern="100" dirty="0">
+              <a:latin typeface="Calibri" panose="020F0502020204030204" pitchFamily="34" charset="0"/>
+              <a:ea typeface="Calibri" panose="020F0502020204030204" pitchFamily="34" charset="0"/>
+              <a:cs typeface="Times New Roman" panose="02020603050405020304" pitchFamily="18" charset="0"/>
+            </a:endParaRPr>
+          </a:p>
+          <a:p>
+            <a:pPr marL="800100" lvl="1" indent="-342900"/>
+            <a:r>
+              <a:rPr lang="en-US" sz="2000" kern="100" dirty="0">
+                <a:latin typeface="Calibri" panose="020F0502020204030204" pitchFamily="34" charset="0"/>
+                <a:ea typeface="Calibri" panose="020F0502020204030204" pitchFamily="34" charset="0"/>
+                <a:cs typeface="Times New Roman" panose="02020603050405020304" pitchFamily="18" charset="0"/>
+              </a:rPr>
+              <a:t>Both NBN and BBN applied at the same time.</a:t>
+            </a:r>
+          </a:p>
+        </p:txBody>
+      </p:sp>
+    </p:spTree>
+    <p:extLst>
+      <p:ext uri="{BB962C8B-B14F-4D97-AF65-F5344CB8AC3E}">
+        <p14:creationId xmlns:p14="http://schemas.microsoft.com/office/powerpoint/2010/main" val="830721782"/>
+      </p:ext>
+    </p:extLst>
+  </p:cSld>
+  <p:clrMapOvr>
+    <a:masterClrMapping/>
+  </p:clrMapOvr>
+</p:sld>
+</file>
+
 <file path=ppt/slides/slide7.xml><?xml version="1.0" encoding="utf-8"?>
 <p:sld xmlns:a="http://schemas.openxmlformats.org/drawingml/2006/main" xmlns:r="http://schemas.openxmlformats.org/officeDocument/2006/relationships" xmlns:p="http://schemas.openxmlformats.org/presentationml/2006/main">
   <p:cSld>
@@ -4989,7 +4715,7 @@
           <p:cNvPr id="2" name="Title 1">
             <a:extLst>
               <a:ext uri="{FF2B5EF4-FFF2-40B4-BE49-F238E27FC236}">
-                <a16:creationId xmlns:a16="http://schemas.microsoft.com/office/drawing/2014/main" id="{C778E3D7-EDB8-FB1A-B95E-8E8279798820}"/>
+                <a16:creationId xmlns:a16="http://schemas.microsoft.com/office/drawing/2014/main" id="{1D866218-7451-3785-5799-91F1A20951D9}"/>
               </a:ext>
             </a:extLst>
           </p:cNvPr>
@@ -5007,7 +4733,7 @@
           <a:p>
             <a:r>
               <a:rPr lang="en-US" dirty="0"/>
-              <a:t>Activity 3</a:t>
+              <a:t>NBN</a:t>
             </a:r>
           </a:p>
         </p:txBody>
@@ -5017,7 +4743,7 @@
           <p:cNvPr id="3" name="Content Placeholder 2">
             <a:extLst>
               <a:ext uri="{FF2B5EF4-FFF2-40B4-BE49-F238E27FC236}">
-                <a16:creationId xmlns:a16="http://schemas.microsoft.com/office/drawing/2014/main" id="{78A5FF63-E4E5-CF82-625E-96C579770BE5}"/>
+                <a16:creationId xmlns:a16="http://schemas.microsoft.com/office/drawing/2014/main" id="{8ABBC50B-5C6E-F0C9-BC4A-72EA7755B90C}"/>
               </a:ext>
             </a:extLst>
           </p:cNvPr>
@@ -5030,22 +4756,70 @@
         </p:nvSpPr>
         <p:spPr/>
         <p:txBody>
-          <a:bodyPr/>
+          <a:bodyPr>
+            <a:normAutofit fontScale="85000" lnSpcReduction="10000"/>
+          </a:bodyPr>
           <a:lstStyle/>
-          <a:p>
-            <a:r>
-              <a:rPr lang="en-US" dirty="0"/>
-              <a:t>Filter ability to clean up input signal (noise)</a:t>
-            </a:r>
-          </a:p>
           <a:p>
             <a:pPr marL="342900" indent="-342900">
               <a:buFont typeface="Arial" panose="020B0604020202020204" pitchFamily="34" charset="0"/>
               <a:buChar char="•"/>
             </a:pPr>
             <a:r>
-              <a:rPr lang="en-US" dirty="0"/>
-              <a:t>Must compare PIS before and after</a:t>
+              <a:rPr lang="en-US" kern="100" dirty="0">
+                <a:latin typeface="Calibri" panose="020F0502020204030204" pitchFamily="34" charset="0"/>
+                <a:ea typeface="Calibri" panose="020F0502020204030204" pitchFamily="34" charset="0"/>
+                <a:cs typeface="Times New Roman" panose="02020603050405020304" pitchFamily="18" charset="0"/>
+              </a:rPr>
+              <a:t>Characterize the PIS spectrum in dB value in identifying its half-power bandwidth [</a:t>
+            </a:r>
+            <a:r>
+              <a:rPr lang="en-US" kern="100" dirty="0" err="1">
+                <a:latin typeface="Calibri" panose="020F0502020204030204" pitchFamily="34" charset="0"/>
+                <a:ea typeface="Calibri" panose="020F0502020204030204" pitchFamily="34" charset="0"/>
+                <a:cs typeface="Times New Roman" panose="02020603050405020304" pitchFamily="18" charset="0"/>
+              </a:rPr>
+              <a:t>f</a:t>
+            </a:r>
+            <a:r>
+              <a:rPr lang="en-US" kern="100" baseline="-25000" dirty="0" err="1">
+                <a:latin typeface="Calibri" panose="020F0502020204030204" pitchFamily="34" charset="0"/>
+                <a:ea typeface="Calibri" panose="020F0502020204030204" pitchFamily="34" charset="0"/>
+                <a:cs typeface="Times New Roman" panose="02020603050405020304" pitchFamily="18" charset="0"/>
+              </a:rPr>
+              <a:t>PISmin</a:t>
+            </a:r>
+            <a:r>
+              <a:rPr lang="en-US" kern="100" dirty="0">
+                <a:latin typeface="Calibri" panose="020F0502020204030204" pitchFamily="34" charset="0"/>
+                <a:ea typeface="Calibri" panose="020F0502020204030204" pitchFamily="34" charset="0"/>
+                <a:cs typeface="Times New Roman" panose="02020603050405020304" pitchFamily="18" charset="0"/>
+              </a:rPr>
+              <a:t>, </a:t>
+            </a:r>
+            <a:r>
+              <a:rPr lang="en-US" kern="100" dirty="0" err="1">
+                <a:latin typeface="Calibri" panose="020F0502020204030204" pitchFamily="34" charset="0"/>
+                <a:ea typeface="Calibri" panose="020F0502020204030204" pitchFamily="34" charset="0"/>
+                <a:cs typeface="Times New Roman" panose="02020603050405020304" pitchFamily="18" charset="0"/>
+              </a:rPr>
+              <a:t>f</a:t>
+            </a:r>
+            <a:r>
+              <a:rPr lang="en-US" kern="100" baseline="-25000" dirty="0" err="1">
+                <a:latin typeface="Calibri" panose="020F0502020204030204" pitchFamily="34" charset="0"/>
+                <a:ea typeface="Calibri" panose="020F0502020204030204" pitchFamily="34" charset="0"/>
+                <a:cs typeface="Times New Roman" panose="02020603050405020304" pitchFamily="18" charset="0"/>
+              </a:rPr>
+              <a:t>PISmax</a:t>
+            </a:r>
+            <a:r>
+              <a:rPr lang="en-US" kern="100" dirty="0">
+                <a:latin typeface="Calibri" panose="020F0502020204030204" pitchFamily="34" charset="0"/>
+                <a:ea typeface="Calibri" panose="020F0502020204030204" pitchFamily="34" charset="0"/>
+                <a:cs typeface="Times New Roman" panose="02020603050405020304" pitchFamily="18" charset="0"/>
+              </a:rPr>
+              <a:t>]</a:t>
             </a:r>
           </a:p>
           <a:p>
@@ -5054,12 +4828,12 @@
               <a:buChar char="•"/>
             </a:pPr>
             <a:r>
-              <a:rPr lang="en-US" dirty="0">
-                <a:highlight>
-                  <a:srgbClr val="FFFF00"/>
-                </a:highlight>
-              </a:rPr>
-              <a:t>Noise must be one of the following</a:t>
+              <a:rPr lang="en-US" kern="100" dirty="0">
+                <a:latin typeface="Calibri" panose="020F0502020204030204" pitchFamily="34" charset="0"/>
+                <a:ea typeface="Calibri" panose="020F0502020204030204" pitchFamily="34" charset="0"/>
+                <a:cs typeface="Times New Roman" panose="02020603050405020304" pitchFamily="18" charset="0"/>
+              </a:rPr>
+              <a:t>Mix the PIS with a Narrowband Noise (NBN) defined as follows:</a:t>
             </a:r>
           </a:p>
           <a:p>
@@ -5070,18 +4844,174 @@
                 <a:ea typeface="Calibri" panose="020F0502020204030204" pitchFamily="34" charset="0"/>
                 <a:cs typeface="Times New Roman" panose="02020603050405020304" pitchFamily="18" charset="0"/>
               </a:rPr>
-              <a:t>A sinewave alone applied to the </a:t>
-            </a:r>
-            <a:r>
-              <a:rPr lang="en-US" sz="2000" kern="100" dirty="0">
-                <a:latin typeface="Calibri" panose="020F0502020204030204" pitchFamily="34" charset="0"/>
-                <a:ea typeface="Calibri" panose="020F0502020204030204" pitchFamily="34" charset="0"/>
-                <a:cs typeface="Times New Roman" panose="02020603050405020304" pitchFamily="18" charset="0"/>
-              </a:rPr>
-              <a:t>Narrow Band Noise (NBN) block</a:t>
-            </a:r>
-            <a:r>
-              <a:rPr lang="en-US" sz="2000" kern="100" dirty="0">
+              <a:t>Signal type: sinewave</a:t>
+            </a:r>
+          </a:p>
+          <a:p>
+            <a:pPr marL="800100" lvl="1" indent="-342900"/>
+            <a:r>
+              <a:rPr lang="en-US" kern="100" dirty="0">
+                <a:latin typeface="Calibri" panose="020F0502020204030204" pitchFamily="34" charset="0"/>
+                <a:ea typeface="Calibri" panose="020F0502020204030204" pitchFamily="34" charset="0"/>
+                <a:cs typeface="Times New Roman" panose="02020603050405020304" pitchFamily="18" charset="0"/>
+              </a:rPr>
+              <a:t>Frequency = PIS’ center frequency =(1/2)(</a:t>
+            </a:r>
+            <a:r>
+              <a:rPr lang="en-US" kern="100" dirty="0" err="1">
+                <a:latin typeface="Calibri" panose="020F0502020204030204" pitchFamily="34" charset="0"/>
+                <a:ea typeface="Calibri" panose="020F0502020204030204" pitchFamily="34" charset="0"/>
+                <a:cs typeface="Times New Roman" panose="02020603050405020304" pitchFamily="18" charset="0"/>
+              </a:rPr>
+              <a:t>f</a:t>
+            </a:r>
+            <a:r>
+              <a:rPr lang="en-US" kern="100" baseline="-25000" dirty="0" err="1">
+                <a:latin typeface="Calibri" panose="020F0502020204030204" pitchFamily="34" charset="0"/>
+                <a:ea typeface="Calibri" panose="020F0502020204030204" pitchFamily="34" charset="0"/>
+                <a:cs typeface="Times New Roman" panose="02020603050405020304" pitchFamily="18" charset="0"/>
+              </a:rPr>
+              <a:t>PISmin</a:t>
+            </a:r>
+            <a:r>
+              <a:rPr lang="en-US" kern="100" dirty="0">
+                <a:latin typeface="Calibri" panose="020F0502020204030204" pitchFamily="34" charset="0"/>
+                <a:ea typeface="Calibri" panose="020F0502020204030204" pitchFamily="34" charset="0"/>
+                <a:cs typeface="Times New Roman" panose="02020603050405020304" pitchFamily="18" charset="0"/>
+              </a:rPr>
+              <a:t> + </a:t>
+            </a:r>
+            <a:r>
+              <a:rPr lang="en-US" kern="100" dirty="0" err="1">
+                <a:latin typeface="Calibri" panose="020F0502020204030204" pitchFamily="34" charset="0"/>
+                <a:ea typeface="Calibri" panose="020F0502020204030204" pitchFamily="34" charset="0"/>
+                <a:cs typeface="Times New Roman" panose="02020603050405020304" pitchFamily="18" charset="0"/>
+              </a:rPr>
+              <a:t>f</a:t>
+            </a:r>
+            <a:r>
+              <a:rPr lang="en-US" kern="100" baseline="-25000" dirty="0" err="1">
+                <a:latin typeface="Calibri" panose="020F0502020204030204" pitchFamily="34" charset="0"/>
+                <a:ea typeface="Calibri" panose="020F0502020204030204" pitchFamily="34" charset="0"/>
+                <a:cs typeface="Times New Roman" panose="02020603050405020304" pitchFamily="18" charset="0"/>
+              </a:rPr>
+              <a:t>PISmax</a:t>
+            </a:r>
+            <a:r>
+              <a:rPr lang="en-US" kern="100" dirty="0">
+                <a:latin typeface="Calibri" panose="020F0502020204030204" pitchFamily="34" charset="0"/>
+                <a:ea typeface="Calibri" panose="020F0502020204030204" pitchFamily="34" charset="0"/>
+                <a:cs typeface="Times New Roman" panose="02020603050405020304" pitchFamily="18" charset="0"/>
+              </a:rPr>
+              <a:t>)</a:t>
+            </a:r>
+          </a:p>
+          <a:p>
+            <a:pPr marL="800100" lvl="1" indent="-342900"/>
+            <a:r>
+              <a:rPr lang="en-US" kern="100" dirty="0">
+                <a:latin typeface="Calibri" panose="020F0502020204030204" pitchFamily="34" charset="0"/>
+                <a:ea typeface="Calibri" panose="020F0502020204030204" pitchFamily="34" charset="0"/>
+                <a:cs typeface="Times New Roman" panose="02020603050405020304" pitchFamily="18" charset="0"/>
+              </a:rPr>
+              <a:t>RMS amplitude =  PIS’ average amplitude over the half-power bandwidth [</a:t>
+            </a:r>
+            <a:r>
+              <a:rPr lang="en-US" kern="100" dirty="0" err="1">
+                <a:latin typeface="Calibri" panose="020F0502020204030204" pitchFamily="34" charset="0"/>
+                <a:ea typeface="Calibri" panose="020F0502020204030204" pitchFamily="34" charset="0"/>
+                <a:cs typeface="Times New Roman" panose="02020603050405020304" pitchFamily="18" charset="0"/>
+              </a:rPr>
+              <a:t>fmin</a:t>
+            </a:r>
+            <a:r>
+              <a:rPr lang="en-US" kern="100" dirty="0">
+                <a:latin typeface="Calibri" panose="020F0502020204030204" pitchFamily="34" charset="0"/>
+                <a:ea typeface="Calibri" panose="020F0502020204030204" pitchFamily="34" charset="0"/>
+                <a:cs typeface="Times New Roman" panose="02020603050405020304" pitchFamily="18" charset="0"/>
+              </a:rPr>
+              <a:t>, fmax]</a:t>
+            </a:r>
+          </a:p>
+          <a:p>
+            <a:pPr marL="342900" indent="-342900">
+              <a:buFont typeface="Arial" panose="020B0604020202020204" pitchFamily="34" charset="0"/>
+              <a:buChar char="•"/>
+            </a:pPr>
+            <a:r>
+              <a:rPr lang="en-US" kern="100" dirty="0">
+                <a:latin typeface="Calibri" panose="020F0502020204030204" pitchFamily="34" charset="0"/>
+                <a:ea typeface="Calibri" panose="020F0502020204030204" pitchFamily="34" charset="0"/>
+                <a:cs typeface="Times New Roman" panose="02020603050405020304" pitchFamily="18" charset="0"/>
+              </a:rPr>
+              <a:t>Display the spectrum of the non-filtered compound signal PIS mixed with NBN denoted as PIS&amp;NBN</a:t>
+            </a:r>
+          </a:p>
+          <a:p>
+            <a:pPr marL="800100" lvl="1" indent="-342900"/>
+            <a:r>
+              <a:rPr lang="en-US" kern="100" dirty="0">
+                <a:latin typeface="Calibri" panose="020F0502020204030204" pitchFamily="34" charset="0"/>
+                <a:ea typeface="Calibri" panose="020F0502020204030204" pitchFamily="34" charset="0"/>
+                <a:cs typeface="Times New Roman" panose="02020603050405020304" pitchFamily="18" charset="0"/>
+              </a:rPr>
+              <a:t>Characterize the Signal to Noise ratio of PIS&amp;NBN</a:t>
+            </a:r>
+          </a:p>
+          <a:p>
+            <a:pPr marL="342900" indent="-342900">
+              <a:buFont typeface="Arial" panose="020B0604020202020204" pitchFamily="34" charset="0"/>
+              <a:buChar char="•"/>
+            </a:pPr>
+            <a:r>
+              <a:rPr lang="en-US" kern="100" dirty="0">
+                <a:latin typeface="Calibri" panose="020F0502020204030204" pitchFamily="34" charset="0"/>
+                <a:ea typeface="Calibri" panose="020F0502020204030204" pitchFamily="34" charset="0"/>
+                <a:cs typeface="Times New Roman" panose="02020603050405020304" pitchFamily="18" charset="0"/>
+              </a:rPr>
+              <a:t>Display the spectrum of the filtered PIS&amp;NBN denoted as F_ PIS&amp;NBN</a:t>
+            </a:r>
+          </a:p>
+          <a:p>
+            <a:pPr marL="800100" lvl="1" indent="-342900"/>
+            <a:r>
+              <a:rPr lang="en-US" kern="100" dirty="0">
+                <a:latin typeface="Calibri" panose="020F0502020204030204" pitchFamily="34" charset="0"/>
+                <a:ea typeface="Calibri" panose="020F0502020204030204" pitchFamily="34" charset="0"/>
+                <a:cs typeface="Times New Roman" panose="02020603050405020304" pitchFamily="18" charset="0"/>
+              </a:rPr>
+              <a:t>Characterize the Signal to Noise ratio of F_ PIS&amp;NBN </a:t>
+            </a:r>
+          </a:p>
+          <a:p>
+            <a:pPr marL="342900" indent="-342900">
+              <a:buFont typeface="Arial" panose="020B0604020202020204" pitchFamily="34" charset="0"/>
+              <a:buChar char="•"/>
+            </a:pPr>
+            <a:r>
+              <a:rPr lang="en-US" kern="100" dirty="0">
+                <a:latin typeface="Calibri" panose="020F0502020204030204" pitchFamily="34" charset="0"/>
+                <a:ea typeface="Calibri" panose="020F0502020204030204" pitchFamily="34" charset="0"/>
+                <a:cs typeface="Times New Roman" panose="02020603050405020304" pitchFamily="18" charset="0"/>
+              </a:rPr>
+              <a:t>Use the Spectrum Analyzer capability or use a subtractor block to compare PIS with PIS&amp;NBN</a:t>
+            </a:r>
+          </a:p>
+          <a:p>
+            <a:pPr marL="342900" indent="-342900">
+              <a:buFont typeface="Arial" panose="020B0604020202020204" pitchFamily="34" charset="0"/>
+              <a:buChar char="•"/>
+            </a:pPr>
+            <a:r>
+              <a:rPr lang="en-US" kern="100" dirty="0">
+                <a:latin typeface="Calibri" panose="020F0502020204030204" pitchFamily="34" charset="0"/>
+                <a:ea typeface="Calibri" panose="020F0502020204030204" pitchFamily="34" charset="0"/>
+                <a:cs typeface="Times New Roman" panose="02020603050405020304" pitchFamily="18" charset="0"/>
+              </a:rPr>
+              <a:t>Summarize your findings and conclude as to the efficiency of the filtering. If you have determined that the filter is not efficient, provide an explanation as to why. Which of the 2 assigned is most capable to protect the PIS against a Broad Band noise? </a:t>
+            </a:r>
+            <a:r>
+              <a:rPr lang="en-US" kern="100" dirty="0">
                 <a:solidFill>
                   <a:srgbClr val="FF0000"/>
                 </a:solidFill>
@@ -5089,53 +5019,27 @@
                 <a:ea typeface="Calibri" panose="020F0502020204030204" pitchFamily="34" charset="0"/>
                 <a:cs typeface="Times New Roman" panose="02020603050405020304" pitchFamily="18" charset="0"/>
               </a:rPr>
-              <a:t> (See slide 8)</a:t>
-            </a:r>
-          </a:p>
-          <a:p>
-            <a:pPr marL="800100" lvl="1" indent="-342900"/>
-            <a:r>
-              <a:rPr lang="en-US" sz="2000" kern="100" dirty="0">
-                <a:latin typeface="Calibri" panose="020F0502020204030204" pitchFamily="34" charset="0"/>
-                <a:ea typeface="Calibri" panose="020F0502020204030204" pitchFamily="34" charset="0"/>
-                <a:cs typeface="Times New Roman" panose="02020603050405020304" pitchFamily="18" charset="0"/>
-              </a:rPr>
-              <a:t>A Gaussian white noise alone applied  to the Random Source block. This signal is also called Broad Band Noise (BBN) </a:t>
-            </a:r>
-            <a:r>
-              <a:rPr lang="en-US" sz="2000" kern="100" dirty="0">
-                <a:solidFill>
-                  <a:srgbClr val="FF0000"/>
-                </a:solidFill>
-                <a:latin typeface="Calibri" panose="020F0502020204030204" pitchFamily="34" charset="0"/>
-                <a:ea typeface="Calibri" panose="020F0502020204030204" pitchFamily="34" charset="0"/>
-                <a:cs typeface="Times New Roman" panose="02020603050405020304" pitchFamily="18" charset="0"/>
-              </a:rPr>
-              <a:t>(See slide 9)</a:t>
-            </a:r>
-            <a:endParaRPr lang="en-US" sz="2000" kern="100" dirty="0">
+              <a:t>This can be a few bullet points here, then discussed more in depth in report</a:t>
+            </a:r>
+            <a:endParaRPr lang="en-US" kern="100" dirty="0">
               <a:latin typeface="Calibri" panose="020F0502020204030204" pitchFamily="34" charset="0"/>
               <a:ea typeface="Calibri" panose="020F0502020204030204" pitchFamily="34" charset="0"/>
               <a:cs typeface="Times New Roman" panose="02020603050405020304" pitchFamily="18" charset="0"/>
             </a:endParaRPr>
           </a:p>
           <a:p>
-            <a:pPr marL="800100" lvl="1" indent="-342900"/>
-            <a:r>
-              <a:rPr lang="en-US" sz="2000" kern="100" dirty="0">
-                <a:latin typeface="Calibri" panose="020F0502020204030204" pitchFamily="34" charset="0"/>
-                <a:ea typeface="Calibri" panose="020F0502020204030204" pitchFamily="34" charset="0"/>
-                <a:cs typeface="Times New Roman" panose="02020603050405020304" pitchFamily="18" charset="0"/>
-              </a:rPr>
-              <a:t>Both NBN and BBN applied at the same time.</a:t>
-            </a:r>
+            <a:pPr marL="342900" indent="-342900">
+              <a:buFont typeface="Arial" panose="020B0604020202020204" pitchFamily="34" charset="0"/>
+              <a:buChar char="•"/>
+            </a:pPr>
+            <a:endParaRPr lang="en-US" dirty="0"/>
           </a:p>
         </p:txBody>
       </p:sp>
     </p:spTree>
     <p:extLst>
       <p:ext uri="{BB962C8B-B14F-4D97-AF65-F5344CB8AC3E}">
-        <p14:creationId xmlns:p14="http://schemas.microsoft.com/office/powerpoint/2010/main" val="830721782"/>
+        <p14:creationId xmlns:p14="http://schemas.microsoft.com/office/powerpoint/2010/main" val="4078861040"/>
       </p:ext>
     </p:extLst>
   </p:cSld>
@@ -5167,7 +5071,7 @@
           <p:cNvPr id="2" name="Title 1">
             <a:extLst>
               <a:ext uri="{FF2B5EF4-FFF2-40B4-BE49-F238E27FC236}">
-                <a16:creationId xmlns:a16="http://schemas.microsoft.com/office/drawing/2014/main" id="{1D866218-7451-3785-5799-91F1A20951D9}"/>
+                <a16:creationId xmlns:a16="http://schemas.microsoft.com/office/drawing/2014/main" id="{11536382-0D5D-0564-57DD-0CA4B5938F30}"/>
               </a:ext>
             </a:extLst>
           </p:cNvPr>
@@ -5185,7 +5089,7 @@
           <a:p>
             <a:r>
               <a:rPr lang="en-US" dirty="0"/>
-              <a:t>NBN</a:t>
+              <a:t>BBN</a:t>
             </a:r>
           </a:p>
         </p:txBody>
@@ -5195,7 +5099,7 @@
           <p:cNvPr id="3" name="Content Placeholder 2">
             <a:extLst>
               <a:ext uri="{FF2B5EF4-FFF2-40B4-BE49-F238E27FC236}">
-                <a16:creationId xmlns:a16="http://schemas.microsoft.com/office/drawing/2014/main" id="{8ABBC50B-5C6E-F0C9-BC4A-72EA7755B90C}"/>
+                <a16:creationId xmlns:a16="http://schemas.microsoft.com/office/drawing/2014/main" id="{C303818C-AB32-FF4E-EDF0-A8314B961A59}"/>
               </a:ext>
             </a:extLst>
           </p:cNvPr>
@@ -5209,7 +5113,7 @@
         <p:spPr/>
         <p:txBody>
           <a:bodyPr>
-            <a:normAutofit fontScale="85000" lnSpcReduction="10000"/>
+            <a:normAutofit fontScale="85000" lnSpcReduction="20000"/>
           </a:bodyPr>
           <a:lstStyle/>
           <a:p>
@@ -5285,7 +5189,7 @@
                 <a:ea typeface="Calibri" panose="020F0502020204030204" pitchFamily="34" charset="0"/>
                 <a:cs typeface="Times New Roman" panose="02020603050405020304" pitchFamily="18" charset="0"/>
               </a:rPr>
-              <a:t>Mix the PIS with a Narrowband Noise (NBN) defined as follows:</a:t>
+              <a:t>Mix the PIS with a Broad Band Noise (BBN) defined as follows:</a:t>
             </a:r>
           </a:p>
           <a:p>
@@ -5296,7 +5200,7 @@
                 <a:ea typeface="Calibri" panose="020F0502020204030204" pitchFamily="34" charset="0"/>
                 <a:cs typeface="Times New Roman" panose="02020603050405020304" pitchFamily="18" charset="0"/>
               </a:rPr>
-              <a:t>Signal type: sinewave</a:t>
+              <a:t>Signal type: White Noise Gaussian</a:t>
             </a:r>
           </a:p>
           <a:p>
@@ -5307,7 +5211,7 @@
                 <a:ea typeface="Calibri" panose="020F0502020204030204" pitchFamily="34" charset="0"/>
                 <a:cs typeface="Times New Roman" panose="02020603050405020304" pitchFamily="18" charset="0"/>
               </a:rPr>
-              <a:t>Frequency = PIS’ center frequency =(1/2)(</a:t>
+              <a:t>Mean amplitude = PIS’ average amplitude over the half-power bandwidth [</a:t>
             </a:r>
             <a:r>
               <a:rPr lang="en-US" kern="100" dirty="0" err="1">
@@ -5331,7 +5235,7 @@
                 <a:ea typeface="Calibri" panose="020F0502020204030204" pitchFamily="34" charset="0"/>
                 <a:cs typeface="Times New Roman" panose="02020603050405020304" pitchFamily="18" charset="0"/>
               </a:rPr>
-              <a:t> + </a:t>
+              <a:t>, </a:t>
             </a:r>
             <a:r>
               <a:rPr lang="en-US" kern="100" dirty="0" err="1">
@@ -5355,7 +5259,7 @@
                 <a:ea typeface="Calibri" panose="020F0502020204030204" pitchFamily="34" charset="0"/>
                 <a:cs typeface="Times New Roman" panose="02020603050405020304" pitchFamily="18" charset="0"/>
               </a:rPr>
-              <a:t>)</a:t>
+              <a:t>]</a:t>
             </a:r>
           </a:p>
           <a:p>
@@ -5366,7 +5270,7 @@
                 <a:ea typeface="Calibri" panose="020F0502020204030204" pitchFamily="34" charset="0"/>
                 <a:cs typeface="Times New Roman" panose="02020603050405020304" pitchFamily="18" charset="0"/>
               </a:rPr>
-              <a:t>RMS amplitude =  PIS’ average amplitude over the half-power bandwidth [</a:t>
+              <a:t>Standard deviation = RMS value of the PIS spectrum over its half-power bandwidth [</a:t>
             </a:r>
             <a:r>
               <a:rPr lang="en-US" kern="100" dirty="0" err="1">
@@ -5374,7 +5278,15 @@
                 <a:ea typeface="Calibri" panose="020F0502020204030204" pitchFamily="34" charset="0"/>
                 <a:cs typeface="Times New Roman" panose="02020603050405020304" pitchFamily="18" charset="0"/>
               </a:rPr>
-              <a:t>fmin</a:t>
+              <a:t>f</a:t>
+            </a:r>
+            <a:r>
+              <a:rPr lang="en-US" kern="100" baseline="-25000" dirty="0" err="1">
+                <a:latin typeface="Calibri" panose="020F0502020204030204" pitchFamily="34" charset="0"/>
+                <a:ea typeface="Calibri" panose="020F0502020204030204" pitchFamily="34" charset="0"/>
+                <a:cs typeface="Times New Roman" panose="02020603050405020304" pitchFamily="18" charset="0"/>
+              </a:rPr>
+              <a:t>PISmin</a:t>
             </a:r>
             <a:r>
               <a:rPr lang="en-US" kern="100" dirty="0">
@@ -5382,7 +5294,31 @@
                 <a:ea typeface="Calibri" panose="020F0502020204030204" pitchFamily="34" charset="0"/>
                 <a:cs typeface="Times New Roman" panose="02020603050405020304" pitchFamily="18" charset="0"/>
               </a:rPr>
-              <a:t>, fmax]</a:t>
+              <a:t>, </a:t>
+            </a:r>
+            <a:r>
+              <a:rPr lang="en-US" kern="100" dirty="0" err="1">
+                <a:latin typeface="Calibri" panose="020F0502020204030204" pitchFamily="34" charset="0"/>
+                <a:ea typeface="Calibri" panose="020F0502020204030204" pitchFamily="34" charset="0"/>
+                <a:cs typeface="Times New Roman" panose="02020603050405020304" pitchFamily="18" charset="0"/>
+              </a:rPr>
+              <a:t>f</a:t>
+            </a:r>
+            <a:r>
+              <a:rPr lang="en-US" kern="100" baseline="-25000" dirty="0" err="1">
+                <a:latin typeface="Calibri" panose="020F0502020204030204" pitchFamily="34" charset="0"/>
+                <a:ea typeface="Calibri" panose="020F0502020204030204" pitchFamily="34" charset="0"/>
+                <a:cs typeface="Times New Roman" panose="02020603050405020304" pitchFamily="18" charset="0"/>
+              </a:rPr>
+              <a:t>PISmax</a:t>
+            </a:r>
+            <a:r>
+              <a:rPr lang="en-US" kern="100" dirty="0">
+                <a:latin typeface="Calibri" panose="020F0502020204030204" pitchFamily="34" charset="0"/>
+                <a:ea typeface="Calibri" panose="020F0502020204030204" pitchFamily="34" charset="0"/>
+                <a:cs typeface="Times New Roman" panose="02020603050405020304" pitchFamily="18" charset="0"/>
+              </a:rPr>
+              <a:t>]</a:t>
             </a:r>
           </a:p>
           <a:p>
@@ -5396,7 +5332,7 @@
                 <a:ea typeface="Calibri" panose="020F0502020204030204" pitchFamily="34" charset="0"/>
                 <a:cs typeface="Times New Roman" panose="02020603050405020304" pitchFamily="18" charset="0"/>
               </a:rPr>
-              <a:t>Display the spectrum of the non-filtered compound signal PIS mixed with NBN denoted as PIS&amp;NBN</a:t>
+              <a:t>Display the spectrum of the non-filtered compound signal PIS mixed with BBN denoted as PIS&amp;BBN</a:t>
             </a:r>
           </a:p>
           <a:p>
@@ -5407,7 +5343,7 @@
                 <a:ea typeface="Calibri" panose="020F0502020204030204" pitchFamily="34" charset="0"/>
                 <a:cs typeface="Times New Roman" panose="02020603050405020304" pitchFamily="18" charset="0"/>
               </a:rPr>
-              <a:t>Characterize the Signal to Noise ratio of PIS&amp;NBN</a:t>
+              <a:t>Characterize the Signal to Noise ratio of PIS&amp;BBN</a:t>
             </a:r>
           </a:p>
           <a:p>
@@ -5421,7 +5357,7 @@
                 <a:ea typeface="Calibri" panose="020F0502020204030204" pitchFamily="34" charset="0"/>
                 <a:cs typeface="Times New Roman" panose="02020603050405020304" pitchFamily="18" charset="0"/>
               </a:rPr>
-              <a:t>Display the spectrum of the filtered PIS&amp;NBN denoted as F_ PIS&amp;NBN</a:t>
+              <a:t>Display the spectrum of the filtered PIS&amp;BBN denoted as F_ PIS&amp;BBN </a:t>
             </a:r>
           </a:p>
           <a:p>
@@ -5432,7 +5368,7 @@
                 <a:ea typeface="Calibri" panose="020F0502020204030204" pitchFamily="34" charset="0"/>
                 <a:cs typeface="Times New Roman" panose="02020603050405020304" pitchFamily="18" charset="0"/>
               </a:rPr>
-              <a:t>Characterize the Signal to Noise ratio of F_ PIS&amp;NBN </a:t>
+              <a:t>Characterize the Signal to Noise ratio of F_ PIS&amp;BBN</a:t>
             </a:r>
           </a:p>
           <a:p>
@@ -5446,7 +5382,7 @@
                 <a:ea typeface="Calibri" panose="020F0502020204030204" pitchFamily="34" charset="0"/>
                 <a:cs typeface="Times New Roman" panose="02020603050405020304" pitchFamily="18" charset="0"/>
               </a:rPr>
-              <a:t>Use the Spectrum Analyzer capability or use a subtractor block to compare PIS with PIS&amp;NBN</a:t>
+              <a:t>Use the Spectrum Analyzer capability or use a subtractor block to compare PIS with PIS&amp;BBN</a:t>
             </a:r>
           </a:p>
           <a:p>
@@ -5484,6 +5420,27 @@
               <a:buFont typeface="Arial" panose="020B0604020202020204" pitchFamily="34" charset="0"/>
               <a:buChar char="•"/>
             </a:pPr>
+            <a:endParaRPr lang="en-US" kern="100" dirty="0">
+              <a:latin typeface="Calibri" panose="020F0502020204030204" pitchFamily="34" charset="0"/>
+              <a:ea typeface="Calibri" panose="020F0502020204030204" pitchFamily="34" charset="0"/>
+              <a:cs typeface="Times New Roman" panose="02020603050405020304" pitchFamily="18" charset="0"/>
+            </a:endParaRPr>
+          </a:p>
+          <a:p>
+            <a:pPr lvl="1" indent="0">
+              <a:buNone/>
+            </a:pPr>
+            <a:endParaRPr lang="en-US" kern="100" dirty="0">
+              <a:latin typeface="Calibri" panose="020F0502020204030204" pitchFamily="34" charset="0"/>
+              <a:ea typeface="Calibri" panose="020F0502020204030204" pitchFamily="34" charset="0"/>
+              <a:cs typeface="Times New Roman" panose="02020603050405020304" pitchFamily="18" charset="0"/>
+            </a:endParaRPr>
+          </a:p>
+          <a:p>
+            <a:pPr marL="342900" indent="-342900">
+              <a:buFont typeface="Arial" panose="020B0604020202020204" pitchFamily="34" charset="0"/>
+              <a:buChar char="•"/>
+            </a:pPr>
             <a:endParaRPr lang="en-US" dirty="0"/>
           </a:p>
         </p:txBody>
@@ -5491,7 +5448,7 @@
     </p:spTree>
     <p:extLst>
       <p:ext uri="{BB962C8B-B14F-4D97-AF65-F5344CB8AC3E}">
-        <p14:creationId xmlns:p14="http://schemas.microsoft.com/office/powerpoint/2010/main" val="4078861040"/>
+        <p14:creationId xmlns:p14="http://schemas.microsoft.com/office/powerpoint/2010/main" val="1814202724"/>
       </p:ext>
     </p:extLst>
   </p:cSld>
@@ -5523,7 +5480,7 @@
           <p:cNvPr id="2" name="Title 1">
             <a:extLst>
               <a:ext uri="{FF2B5EF4-FFF2-40B4-BE49-F238E27FC236}">
-                <a16:creationId xmlns:a16="http://schemas.microsoft.com/office/drawing/2014/main" id="{11536382-0D5D-0564-57DD-0CA4B5938F30}"/>
+                <a16:creationId xmlns:a16="http://schemas.microsoft.com/office/drawing/2014/main" id="{6BBDFEFC-643D-1E91-F069-487F3FBAD5D1}"/>
               </a:ext>
             </a:extLst>
           </p:cNvPr>
@@ -5541,7 +5498,7 @@
           <a:p>
             <a:r>
               <a:rPr lang="en-US" dirty="0"/>
-              <a:t>BBN</a:t>
+              <a:t>Activity 3 Cont.</a:t>
             </a:r>
           </a:p>
         </p:txBody>
@@ -5551,7 +5508,7 @@
           <p:cNvPr id="3" name="Content Placeholder 2">
             <a:extLst>
               <a:ext uri="{FF2B5EF4-FFF2-40B4-BE49-F238E27FC236}">
-                <a16:creationId xmlns:a16="http://schemas.microsoft.com/office/drawing/2014/main" id="{C303818C-AB32-FF4E-EDF0-A8314B961A59}"/>
+                <a16:creationId xmlns:a16="http://schemas.microsoft.com/office/drawing/2014/main" id="{C5246BD0-DF04-9EDB-6EE3-EAE913D32D0E}"/>
               </a:ext>
             </a:extLst>
           </p:cNvPr>
@@ -5564,9 +5521,7 @@
         </p:nvSpPr>
         <p:spPr/>
         <p:txBody>
-          <a:bodyPr>
-            <a:normAutofit fontScale="85000" lnSpcReduction="20000"/>
-          </a:bodyPr>
+          <a:bodyPr/>
           <a:lstStyle/>
           <a:p>
             <a:pPr marL="342900" indent="-342900">
@@ -5574,60 +5529,56 @@
               <a:buChar char="•"/>
             </a:pPr>
             <a:r>
+              <a:rPr lang="en-US" sz="2000" b="1" kern="100" dirty="0">
+                <a:latin typeface="Calibri" panose="020F0502020204030204" pitchFamily="34" charset="0"/>
+                <a:ea typeface="Calibri" panose="020F0502020204030204" pitchFamily="34" charset="0"/>
+                <a:cs typeface="Times New Roman" panose="02020603050405020304" pitchFamily="18" charset="0"/>
+              </a:rPr>
+              <a:t>Comparison of Narrow Band (NB) Broad Band (BB) Noise Filtering</a:t>
+            </a:r>
+          </a:p>
+          <a:p>
+            <a:pPr marL="800100" lvl="1" indent="-342900"/>
+            <a:r>
               <a:rPr lang="en-US" kern="100" dirty="0">
                 <a:latin typeface="Calibri" panose="020F0502020204030204" pitchFamily="34" charset="0"/>
                 <a:ea typeface="Calibri" panose="020F0502020204030204" pitchFamily="34" charset="0"/>
                 <a:cs typeface="Times New Roman" panose="02020603050405020304" pitchFamily="18" charset="0"/>
               </a:rPr>
-              <a:t>Characterize the PIS spectrum in dB value in identifying its half-power bandwidth [</a:t>
-            </a:r>
-            <a:r>
-              <a:rPr lang="en-US" kern="100" dirty="0" err="1">
-                <a:latin typeface="Calibri" panose="020F0502020204030204" pitchFamily="34" charset="0"/>
-                <a:ea typeface="Calibri" panose="020F0502020204030204" pitchFamily="34" charset="0"/>
-                <a:cs typeface="Times New Roman" panose="02020603050405020304" pitchFamily="18" charset="0"/>
-              </a:rPr>
-              <a:t>f</a:t>
-            </a:r>
-            <a:r>
-              <a:rPr lang="en-US" kern="100" baseline="-25000" dirty="0" err="1">
-                <a:latin typeface="Calibri" panose="020F0502020204030204" pitchFamily="34" charset="0"/>
-                <a:ea typeface="Calibri" panose="020F0502020204030204" pitchFamily="34" charset="0"/>
-                <a:cs typeface="Times New Roman" panose="02020603050405020304" pitchFamily="18" charset="0"/>
-              </a:rPr>
-              <a:t>PISmin</a:t>
-            </a:r>
+              <a:t>Which type of noise signal is the easiest to filter?</a:t>
+            </a:r>
+          </a:p>
+          <a:p>
+            <a:pPr marL="800100" lvl="1" indent="-342900"/>
+            <a:r>
+              <a:rPr lang="en-US" sz="2000" kern="100" dirty="0">
+                <a:latin typeface="Calibri" panose="020F0502020204030204" pitchFamily="34" charset="0"/>
+                <a:ea typeface="Calibri" panose="020F0502020204030204" pitchFamily="34" charset="0"/>
+                <a:cs typeface="Times New Roman" panose="02020603050405020304" pitchFamily="18" charset="0"/>
+              </a:rPr>
+              <a:t>What filter is most efficient in protecting against:</a:t>
+            </a:r>
+          </a:p>
+          <a:p>
+            <a:pPr marL="1485900" lvl="2" indent="-342900"/>
             <a:r>
               <a:rPr lang="en-US" kern="100" dirty="0">
                 <a:latin typeface="Calibri" panose="020F0502020204030204" pitchFamily="34" charset="0"/>
                 <a:ea typeface="Calibri" panose="020F0502020204030204" pitchFamily="34" charset="0"/>
                 <a:cs typeface="Times New Roman" panose="02020603050405020304" pitchFamily="18" charset="0"/>
               </a:rPr>
-              <a:t>, </a:t>
-            </a:r>
-            <a:r>
-              <a:rPr lang="en-US" kern="100" dirty="0" err="1">
-                <a:latin typeface="Calibri" panose="020F0502020204030204" pitchFamily="34" charset="0"/>
-                <a:ea typeface="Calibri" panose="020F0502020204030204" pitchFamily="34" charset="0"/>
-                <a:cs typeface="Times New Roman" panose="02020603050405020304" pitchFamily="18" charset="0"/>
-              </a:rPr>
-              <a:t>f</a:t>
-            </a:r>
-            <a:r>
-              <a:rPr lang="en-US" kern="100" baseline="-25000" dirty="0" err="1">
-                <a:latin typeface="Calibri" panose="020F0502020204030204" pitchFamily="34" charset="0"/>
-                <a:ea typeface="Calibri" panose="020F0502020204030204" pitchFamily="34" charset="0"/>
-                <a:cs typeface="Times New Roman" panose="02020603050405020304" pitchFamily="18" charset="0"/>
-              </a:rPr>
-              <a:t>PISmax</a:t>
-            </a:r>
-            <a:r>
-              <a:rPr lang="en-US" kern="100" dirty="0">
-                <a:latin typeface="Calibri" panose="020F0502020204030204" pitchFamily="34" charset="0"/>
-                <a:ea typeface="Calibri" panose="020F0502020204030204" pitchFamily="34" charset="0"/>
-                <a:cs typeface="Times New Roman" panose="02020603050405020304" pitchFamily="18" charset="0"/>
-              </a:rPr>
-              <a:t>]</a:t>
+              <a:t>NBN</a:t>
+            </a:r>
+          </a:p>
+          <a:p>
+            <a:pPr marL="1485900" lvl="2" indent="-342900"/>
+            <a:r>
+              <a:rPr lang="en-US" sz="2000" kern="100" dirty="0">
+                <a:latin typeface="Calibri" panose="020F0502020204030204" pitchFamily="34" charset="0"/>
+                <a:ea typeface="Calibri" panose="020F0502020204030204" pitchFamily="34" charset="0"/>
+                <a:cs typeface="Times New Roman" panose="02020603050405020304" pitchFamily="18" charset="0"/>
+              </a:rPr>
+              <a:t>BBN</a:t>
             </a:r>
           </a:p>
           <a:p>
@@ -5636,263 +5587,15 @@
               <a:buChar char="•"/>
             </a:pPr>
             <a:r>
-              <a:rPr lang="en-US" kern="100" dirty="0">
-                <a:latin typeface="Calibri" panose="020F0502020204030204" pitchFamily="34" charset="0"/>
-                <a:ea typeface="Calibri" panose="020F0502020204030204" pitchFamily="34" charset="0"/>
-                <a:cs typeface="Times New Roman" panose="02020603050405020304" pitchFamily="18" charset="0"/>
-              </a:rPr>
-              <a:t>Mix the PIS with a Broad Band Noise (BBN) defined as follows:</a:t>
-            </a:r>
-          </a:p>
-          <a:p>
-            <a:pPr marL="800100" lvl="1" indent="-342900"/>
-            <a:r>
-              <a:rPr lang="en-US" kern="100" dirty="0">
-                <a:latin typeface="Calibri" panose="020F0502020204030204" pitchFamily="34" charset="0"/>
-                <a:ea typeface="Calibri" panose="020F0502020204030204" pitchFamily="34" charset="0"/>
-                <a:cs typeface="Times New Roman" panose="02020603050405020304" pitchFamily="18" charset="0"/>
-              </a:rPr>
-              <a:t>Signal type: White Noise Gaussian</a:t>
-            </a:r>
-          </a:p>
-          <a:p>
-            <a:pPr marL="800100" lvl="1" indent="-342900"/>
-            <a:r>
-              <a:rPr lang="en-US" kern="100" dirty="0">
-                <a:latin typeface="Calibri" panose="020F0502020204030204" pitchFamily="34" charset="0"/>
-                <a:ea typeface="Calibri" panose="020F0502020204030204" pitchFamily="34" charset="0"/>
-                <a:cs typeface="Times New Roman" panose="02020603050405020304" pitchFamily="18" charset="0"/>
-              </a:rPr>
-              <a:t>Mean amplitude = PIS’ average amplitude over the half-power bandwidth [</a:t>
-            </a:r>
-            <a:r>
-              <a:rPr lang="en-US" kern="100" dirty="0" err="1">
-                <a:latin typeface="Calibri" panose="020F0502020204030204" pitchFamily="34" charset="0"/>
-                <a:ea typeface="Calibri" panose="020F0502020204030204" pitchFamily="34" charset="0"/>
-                <a:cs typeface="Times New Roman" panose="02020603050405020304" pitchFamily="18" charset="0"/>
-              </a:rPr>
-              <a:t>f</a:t>
-            </a:r>
-            <a:r>
-              <a:rPr lang="en-US" kern="100" baseline="-25000" dirty="0" err="1">
-                <a:latin typeface="Calibri" panose="020F0502020204030204" pitchFamily="34" charset="0"/>
-                <a:ea typeface="Calibri" panose="020F0502020204030204" pitchFamily="34" charset="0"/>
-                <a:cs typeface="Times New Roman" panose="02020603050405020304" pitchFamily="18" charset="0"/>
-              </a:rPr>
-              <a:t>PISmin</a:t>
-            </a:r>
-            <a:r>
-              <a:rPr lang="en-US" kern="100" dirty="0">
-                <a:latin typeface="Calibri" panose="020F0502020204030204" pitchFamily="34" charset="0"/>
-                <a:ea typeface="Calibri" panose="020F0502020204030204" pitchFamily="34" charset="0"/>
-                <a:cs typeface="Times New Roman" panose="02020603050405020304" pitchFamily="18" charset="0"/>
-              </a:rPr>
-              <a:t>, </a:t>
-            </a:r>
-            <a:r>
-              <a:rPr lang="en-US" kern="100" dirty="0" err="1">
-                <a:latin typeface="Calibri" panose="020F0502020204030204" pitchFamily="34" charset="0"/>
-                <a:ea typeface="Calibri" panose="020F0502020204030204" pitchFamily="34" charset="0"/>
-                <a:cs typeface="Times New Roman" panose="02020603050405020304" pitchFamily="18" charset="0"/>
-              </a:rPr>
-              <a:t>f</a:t>
-            </a:r>
-            <a:r>
-              <a:rPr lang="en-US" kern="100" baseline="-25000" dirty="0" err="1">
-                <a:latin typeface="Calibri" panose="020F0502020204030204" pitchFamily="34" charset="0"/>
-                <a:ea typeface="Calibri" panose="020F0502020204030204" pitchFamily="34" charset="0"/>
-                <a:cs typeface="Times New Roman" panose="02020603050405020304" pitchFamily="18" charset="0"/>
-              </a:rPr>
-              <a:t>PISmax</a:t>
-            </a:r>
-            <a:r>
-              <a:rPr lang="en-US" kern="100" dirty="0">
-                <a:latin typeface="Calibri" panose="020F0502020204030204" pitchFamily="34" charset="0"/>
-                <a:ea typeface="Calibri" panose="020F0502020204030204" pitchFamily="34" charset="0"/>
-                <a:cs typeface="Times New Roman" panose="02020603050405020304" pitchFamily="18" charset="0"/>
-              </a:rPr>
-              <a:t>]</a:t>
-            </a:r>
-          </a:p>
-          <a:p>
-            <a:pPr marL="800100" lvl="1" indent="-342900"/>
-            <a:r>
-              <a:rPr lang="en-US" kern="100" dirty="0">
-                <a:latin typeface="Calibri" panose="020F0502020204030204" pitchFamily="34" charset="0"/>
-                <a:ea typeface="Calibri" panose="020F0502020204030204" pitchFamily="34" charset="0"/>
-                <a:cs typeface="Times New Roman" panose="02020603050405020304" pitchFamily="18" charset="0"/>
-              </a:rPr>
-              <a:t>Standard deviation = RMS value of the PIS spectrum over its half-power bandwidth [</a:t>
-            </a:r>
-            <a:r>
-              <a:rPr lang="en-US" kern="100" dirty="0" err="1">
-                <a:latin typeface="Calibri" panose="020F0502020204030204" pitchFamily="34" charset="0"/>
-                <a:ea typeface="Calibri" panose="020F0502020204030204" pitchFamily="34" charset="0"/>
-                <a:cs typeface="Times New Roman" panose="02020603050405020304" pitchFamily="18" charset="0"/>
-              </a:rPr>
-              <a:t>f</a:t>
-            </a:r>
-            <a:r>
-              <a:rPr lang="en-US" kern="100" baseline="-25000" dirty="0" err="1">
-                <a:latin typeface="Calibri" panose="020F0502020204030204" pitchFamily="34" charset="0"/>
-                <a:ea typeface="Calibri" panose="020F0502020204030204" pitchFamily="34" charset="0"/>
-                <a:cs typeface="Times New Roman" panose="02020603050405020304" pitchFamily="18" charset="0"/>
-              </a:rPr>
-              <a:t>PISmin</a:t>
-            </a:r>
-            <a:r>
-              <a:rPr lang="en-US" kern="100" dirty="0">
-                <a:latin typeface="Calibri" panose="020F0502020204030204" pitchFamily="34" charset="0"/>
-                <a:ea typeface="Calibri" panose="020F0502020204030204" pitchFamily="34" charset="0"/>
-                <a:cs typeface="Times New Roman" panose="02020603050405020304" pitchFamily="18" charset="0"/>
-              </a:rPr>
-              <a:t>, </a:t>
-            </a:r>
-            <a:r>
-              <a:rPr lang="en-US" kern="100" dirty="0" err="1">
-                <a:latin typeface="Calibri" panose="020F0502020204030204" pitchFamily="34" charset="0"/>
-                <a:ea typeface="Calibri" panose="020F0502020204030204" pitchFamily="34" charset="0"/>
-                <a:cs typeface="Times New Roman" panose="02020603050405020304" pitchFamily="18" charset="0"/>
-              </a:rPr>
-              <a:t>f</a:t>
-            </a:r>
-            <a:r>
-              <a:rPr lang="en-US" kern="100" baseline="-25000" dirty="0" err="1">
-                <a:latin typeface="Calibri" panose="020F0502020204030204" pitchFamily="34" charset="0"/>
-                <a:ea typeface="Calibri" panose="020F0502020204030204" pitchFamily="34" charset="0"/>
-                <a:cs typeface="Times New Roman" panose="02020603050405020304" pitchFamily="18" charset="0"/>
-              </a:rPr>
-              <a:t>PISmax</a:t>
-            </a:r>
-            <a:r>
-              <a:rPr lang="en-US" kern="100" dirty="0">
-                <a:latin typeface="Calibri" panose="020F0502020204030204" pitchFamily="34" charset="0"/>
-                <a:ea typeface="Calibri" panose="020F0502020204030204" pitchFamily="34" charset="0"/>
-                <a:cs typeface="Times New Roman" panose="02020603050405020304" pitchFamily="18" charset="0"/>
-              </a:rPr>
-              <a:t>]</a:t>
-            </a:r>
-          </a:p>
-          <a:p>
-            <a:pPr marL="342900" indent="-342900">
-              <a:buFont typeface="Arial" panose="020B0604020202020204" pitchFamily="34" charset="0"/>
-              <a:buChar char="•"/>
-            </a:pPr>
-            <a:r>
-              <a:rPr lang="en-US" kern="100" dirty="0">
-                <a:latin typeface="Calibri" panose="020F0502020204030204" pitchFamily="34" charset="0"/>
-                <a:ea typeface="Calibri" panose="020F0502020204030204" pitchFamily="34" charset="0"/>
-                <a:cs typeface="Times New Roman" panose="02020603050405020304" pitchFamily="18" charset="0"/>
-              </a:rPr>
-              <a:t>Display the spectrum of the non-filtered compound signal PIS mixed with BBN denoted as PIS&amp;BBN</a:t>
-            </a:r>
-          </a:p>
-          <a:p>
-            <a:pPr marL="800100" lvl="1" indent="-342900"/>
-            <a:r>
-              <a:rPr lang="en-US" kern="100" dirty="0">
-                <a:latin typeface="Calibri" panose="020F0502020204030204" pitchFamily="34" charset="0"/>
-                <a:ea typeface="Calibri" panose="020F0502020204030204" pitchFamily="34" charset="0"/>
-                <a:cs typeface="Times New Roman" panose="02020603050405020304" pitchFamily="18" charset="0"/>
-              </a:rPr>
-              <a:t>Characterize the Signal to Noise ratio of PIS&amp;BBN</a:t>
-            </a:r>
-          </a:p>
-          <a:p>
-            <a:pPr marL="342900" indent="-342900">
-              <a:buFont typeface="Arial" panose="020B0604020202020204" pitchFamily="34" charset="0"/>
-              <a:buChar char="•"/>
-            </a:pPr>
-            <a:r>
-              <a:rPr lang="en-US" kern="100" dirty="0">
-                <a:latin typeface="Calibri" panose="020F0502020204030204" pitchFamily="34" charset="0"/>
-                <a:ea typeface="Calibri" panose="020F0502020204030204" pitchFamily="34" charset="0"/>
-                <a:cs typeface="Times New Roman" panose="02020603050405020304" pitchFamily="18" charset="0"/>
-              </a:rPr>
-              <a:t>Display the spectrum of the filtered PIS&amp;BBN denoted as F_ PIS&amp;BBN </a:t>
-            </a:r>
-          </a:p>
-          <a:p>
-            <a:pPr marL="800100" lvl="1" indent="-342900"/>
-            <a:r>
-              <a:rPr lang="en-US" kern="100" dirty="0">
-                <a:latin typeface="Calibri" panose="020F0502020204030204" pitchFamily="34" charset="0"/>
-                <a:ea typeface="Calibri" panose="020F0502020204030204" pitchFamily="34" charset="0"/>
-                <a:cs typeface="Times New Roman" panose="02020603050405020304" pitchFamily="18" charset="0"/>
-              </a:rPr>
-              <a:t>Characterize the Signal to Noise ratio of F_ PIS&amp;BBN</a:t>
-            </a:r>
-          </a:p>
-          <a:p>
-            <a:pPr marL="342900" indent="-342900">
-              <a:buFont typeface="Arial" panose="020B0604020202020204" pitchFamily="34" charset="0"/>
-              <a:buChar char="•"/>
-            </a:pPr>
-            <a:r>
-              <a:rPr lang="en-US" kern="100" dirty="0">
-                <a:latin typeface="Calibri" panose="020F0502020204030204" pitchFamily="34" charset="0"/>
-                <a:ea typeface="Calibri" panose="020F0502020204030204" pitchFamily="34" charset="0"/>
-                <a:cs typeface="Times New Roman" panose="02020603050405020304" pitchFamily="18" charset="0"/>
-              </a:rPr>
-              <a:t>Use the Spectrum Analyzer capability or use a subtractor block to compare PIS with PIS&amp;BBN</a:t>
-            </a:r>
-          </a:p>
-          <a:p>
-            <a:pPr marL="342900" indent="-342900">
-              <a:buFont typeface="Arial" panose="020B0604020202020204" pitchFamily="34" charset="0"/>
-              <a:buChar char="•"/>
-            </a:pPr>
-            <a:r>
-              <a:rPr lang="en-US" kern="100" dirty="0">
-                <a:latin typeface="Calibri" panose="020F0502020204030204" pitchFamily="34" charset="0"/>
-                <a:ea typeface="Calibri" panose="020F0502020204030204" pitchFamily="34" charset="0"/>
-                <a:cs typeface="Times New Roman" panose="02020603050405020304" pitchFamily="18" charset="0"/>
-              </a:rPr>
-              <a:t>Summarize your findings and conclude as to the efficiency of the filtering. If you have determined that the filter is not efficient, provide an explanation as to why. Which of the 2 assigned is most capable to protect the PIS against a Broad Band noise? </a:t>
-            </a:r>
-            <a:r>
-              <a:rPr lang="en-US" kern="100" dirty="0">
-                <a:solidFill>
-                  <a:srgbClr val="FF0000"/>
-                </a:solidFill>
-                <a:latin typeface="Calibri" panose="020F0502020204030204" pitchFamily="34" charset="0"/>
-                <a:ea typeface="Calibri" panose="020F0502020204030204" pitchFamily="34" charset="0"/>
-                <a:cs typeface="Times New Roman" panose="02020603050405020304" pitchFamily="18" charset="0"/>
-              </a:rPr>
-              <a:t>This can be a few bullet points here, then discussed more in depth in report</a:t>
-            </a:r>
-            <a:endParaRPr lang="en-US" kern="100" dirty="0">
-              <a:latin typeface="Calibri" panose="020F0502020204030204" pitchFamily="34" charset="0"/>
-              <a:ea typeface="Calibri" panose="020F0502020204030204" pitchFamily="34" charset="0"/>
-              <a:cs typeface="Times New Roman" panose="02020603050405020304" pitchFamily="18" charset="0"/>
-            </a:endParaRPr>
-          </a:p>
-          <a:p>
-            <a:pPr marL="342900" indent="-342900">
-              <a:buFont typeface="Arial" panose="020B0604020202020204" pitchFamily="34" charset="0"/>
-              <a:buChar char="•"/>
-            </a:pPr>
-            <a:endParaRPr lang="en-US" kern="100" dirty="0">
-              <a:latin typeface="Calibri" panose="020F0502020204030204" pitchFamily="34" charset="0"/>
-              <a:ea typeface="Calibri" panose="020F0502020204030204" pitchFamily="34" charset="0"/>
-              <a:cs typeface="Times New Roman" panose="02020603050405020304" pitchFamily="18" charset="0"/>
-            </a:endParaRPr>
-          </a:p>
-          <a:p>
-            <a:pPr lvl="1" indent="0">
-              <a:buNone/>
-            </a:pPr>
-            <a:endParaRPr lang="en-US" kern="100" dirty="0">
-              <a:latin typeface="Calibri" panose="020F0502020204030204" pitchFamily="34" charset="0"/>
-              <a:ea typeface="Calibri" panose="020F0502020204030204" pitchFamily="34" charset="0"/>
-              <a:cs typeface="Times New Roman" panose="02020603050405020304" pitchFamily="18" charset="0"/>
-            </a:endParaRPr>
-          </a:p>
-          <a:p>
-            <a:pPr marL="342900" indent="-342900">
-              <a:buFont typeface="Arial" panose="020B0604020202020204" pitchFamily="34" charset="0"/>
-              <a:buChar char="•"/>
-            </a:pPr>
+              <a:rPr lang="en-US" sz="2000" kern="100" dirty="0">
+                <a:latin typeface="Calibri" panose="020F0502020204030204" pitchFamily="34" charset="0"/>
+                <a:ea typeface="Calibri" panose="020F0502020204030204" pitchFamily="34" charset="0"/>
+                <a:cs typeface="Times New Roman" panose="02020603050405020304" pitchFamily="18" charset="0"/>
+              </a:rPr>
+              <a:t>Need to propose a redesign of the filter that will improve the Signal to Noise ratio by at least 6 dB for NBN given the noise characteristics</a:t>
+            </a:r>
+          </a:p>
+          <a:p>
             <a:endParaRPr lang="en-US" dirty="0"/>
           </a:p>
         </p:txBody>
@@ -5900,7 +5603,7 @@
     </p:spTree>
     <p:extLst>
       <p:ext uri="{BB962C8B-B14F-4D97-AF65-F5344CB8AC3E}">
-        <p14:creationId xmlns:p14="http://schemas.microsoft.com/office/powerpoint/2010/main" val="1814202724"/>
+        <p14:creationId xmlns:p14="http://schemas.microsoft.com/office/powerpoint/2010/main" val="1208810237"/>
       </p:ext>
     </p:extLst>
   </p:cSld>

</xml_diff>